<commit_message>
how to clear the map determinstically...
</commit_message>
<xml_diff>
--- a/classes/prog2016/Prog3-Lecture19.pptx
+++ b/classes/prog2016/Prog3-Lecture19.pptx
@@ -5,7 +5,7 @@
     <p:sldMasterId id="2147483648" r:id="rId1"/>
   </p:sldMasterIdLst>
   <p:notesMasterIdLst>
-    <p:notesMasterId r:id="rId28"/>
+    <p:notesMasterId r:id="rId30"/>
   </p:notesMasterIdLst>
   <p:sldIdLst>
     <p:sldId id="256" r:id="rId2"/>
@@ -21,19 +21,21 @@
     <p:sldId id="267" r:id="rId12"/>
     <p:sldId id="264" r:id="rId13"/>
     <p:sldId id="268" r:id="rId14"/>
-    <p:sldId id="269" r:id="rId15"/>
-    <p:sldId id="270" r:id="rId16"/>
-    <p:sldId id="271" r:id="rId17"/>
-    <p:sldId id="272" r:id="rId18"/>
-    <p:sldId id="273" r:id="rId19"/>
-    <p:sldId id="274" r:id="rId20"/>
-    <p:sldId id="276" r:id="rId21"/>
-    <p:sldId id="277" r:id="rId22"/>
-    <p:sldId id="278" r:id="rId23"/>
-    <p:sldId id="279" r:id="rId24"/>
-    <p:sldId id="280" r:id="rId25"/>
-    <p:sldId id="281" r:id="rId26"/>
-    <p:sldId id="282" r:id="rId27"/>
+    <p:sldId id="283" r:id="rId15"/>
+    <p:sldId id="284" r:id="rId16"/>
+    <p:sldId id="269" r:id="rId17"/>
+    <p:sldId id="270" r:id="rId18"/>
+    <p:sldId id="271" r:id="rId19"/>
+    <p:sldId id="272" r:id="rId20"/>
+    <p:sldId id="273" r:id="rId21"/>
+    <p:sldId id="274" r:id="rId22"/>
+    <p:sldId id="276" r:id="rId23"/>
+    <p:sldId id="277" r:id="rId24"/>
+    <p:sldId id="278" r:id="rId25"/>
+    <p:sldId id="279" r:id="rId26"/>
+    <p:sldId id="280" r:id="rId27"/>
+    <p:sldId id="281" r:id="rId28"/>
+    <p:sldId id="282" r:id="rId29"/>
   </p:sldIdLst>
   <p:sldSz cx="12192000" cy="6858000"/>
   <p:notesSz cx="6858000" cy="9144000"/>
@@ -132,6 +134,11 @@
       </a:defRPr>
     </a:lvl9pPr>
   </p:defaultTextStyle>
+  <p:extLst>
+    <p:ext uri="{EFAFB233-063F-42B5-8137-9DF3F51BA10A}">
+      <p15:sldGuideLst xmlns:p15="http://schemas.microsoft.com/office/powerpoint/2012/main"/>
+    </p:ext>
+  </p:extLst>
 </p:presentation>
 </file>
 
@@ -217,7 +224,7 @@
           <a:p>
             <a:fld id="{827FF0C2-5BD7-4ACE-A692-9F9EF4AE1B37}" type="datetimeFigureOut">
               <a:rPr lang="en-US" smtClean="0"/>
-              <a:t>11/15/2016</a:t>
+              <a:t>11/16/2016</a:t>
             </a:fld>
             <a:endParaRPr lang="en-US"/>
           </a:p>
@@ -312,7 +319,6 @@
               <a:rPr lang="en-US"/>
               <a:t>Fifth level</a:t>
             </a:r>
-            <a:endParaRPr lang="en-US"/>
           </a:p>
         </p:txBody>
       </p:sp>
@@ -553,7 +559,7 @@
             <a:fld id="{C8FB8A4A-58FB-473F-A490-93A2C93F892E}" type="slidenum">
               <a:rPr lang="en-US" smtClean="0"/>
               <a:pPr/>
-              <a:t>20</a:t>
+              <a:t>22</a:t>
             </a:fld>
             <a:endParaRPr lang="en-US"/>
           </a:p>
@@ -640,7 +646,7 @@
             <a:fld id="{C8FB8A4A-58FB-473F-A490-93A2C93F892E}" type="slidenum">
               <a:rPr lang="en-US" smtClean="0"/>
               <a:pPr/>
-              <a:t>21</a:t>
+              <a:t>23</a:t>
             </a:fld>
             <a:endParaRPr lang="en-US"/>
           </a:p>
@@ -727,7 +733,7 @@
             <a:fld id="{C8FB8A4A-58FB-473F-A490-93A2C93F892E}" type="slidenum">
               <a:rPr lang="en-US" smtClean="0"/>
               <a:pPr/>
-              <a:t>22</a:t>
+              <a:t>24</a:t>
             </a:fld>
             <a:endParaRPr lang="en-US"/>
           </a:p>
@@ -814,7 +820,7 @@
             <a:fld id="{C8FB8A4A-58FB-473F-A490-93A2C93F892E}" type="slidenum">
               <a:rPr lang="en-US" smtClean="0"/>
               <a:pPr/>
-              <a:t>23</a:t>
+              <a:t>25</a:t>
             </a:fld>
             <a:endParaRPr lang="en-US"/>
           </a:p>
@@ -901,7 +907,7 @@
             <a:fld id="{C8FB8A4A-58FB-473F-A490-93A2C93F892E}" type="slidenum">
               <a:rPr lang="en-US" smtClean="0"/>
               <a:pPr/>
-              <a:t>24</a:t>
+              <a:t>26</a:t>
             </a:fld>
             <a:endParaRPr lang="en-US"/>
           </a:p>
@@ -965,7 +971,6 @@
               <a:rPr lang="en-US"/>
               <a:t>Click to edit Master title style</a:t>
             </a:r>
-            <a:endParaRPr lang="en-US"/>
           </a:p>
         </p:txBody>
       </p:sp>
@@ -1030,7 +1035,6 @@
               <a:rPr lang="en-US"/>
               <a:t>Click to edit Master subtitle style</a:t>
             </a:r>
-            <a:endParaRPr lang="en-US"/>
           </a:p>
         </p:txBody>
       </p:sp>
@@ -1051,7 +1055,7 @@
           <a:p>
             <a:fld id="{BD7867F7-6ED0-4676-9C58-D45A04AA3FAF}" type="datetimeFigureOut">
               <a:rPr lang="en-US" smtClean="0"/>
-              <a:t>11/15/2016</a:t>
+              <a:t>11/16/2016</a:t>
             </a:fld>
             <a:endParaRPr lang="en-US"/>
           </a:p>
@@ -1148,7 +1152,6 @@
               <a:rPr lang="en-US"/>
               <a:t>Click to edit Master title style</a:t>
             </a:r>
-            <a:endParaRPr lang="en-US"/>
           </a:p>
         </p:txBody>
       </p:sp>
@@ -1200,7 +1203,6 @@
               <a:rPr lang="en-US"/>
               <a:t>Fifth level</a:t>
             </a:r>
-            <a:endParaRPr lang="en-US"/>
           </a:p>
         </p:txBody>
       </p:sp>
@@ -1221,7 +1223,7 @@
           <a:p>
             <a:fld id="{BD7867F7-6ED0-4676-9C58-D45A04AA3FAF}" type="datetimeFigureOut">
               <a:rPr lang="en-US" smtClean="0"/>
-              <a:t>11/15/2016</a:t>
+              <a:t>11/16/2016</a:t>
             </a:fld>
             <a:endParaRPr lang="en-US"/>
           </a:p>
@@ -1323,7 +1325,6 @@
               <a:rPr lang="en-US"/>
               <a:t>Click to edit Master title style</a:t>
             </a:r>
-            <a:endParaRPr lang="en-US"/>
           </a:p>
         </p:txBody>
       </p:sp>
@@ -1380,7 +1381,6 @@
               <a:rPr lang="en-US"/>
               <a:t>Fifth level</a:t>
             </a:r>
-            <a:endParaRPr lang="en-US"/>
           </a:p>
         </p:txBody>
       </p:sp>
@@ -1401,7 +1401,7 @@
           <a:p>
             <a:fld id="{BD7867F7-6ED0-4676-9C58-D45A04AA3FAF}" type="datetimeFigureOut">
               <a:rPr lang="en-US" smtClean="0"/>
-              <a:t>11/15/2016</a:t>
+              <a:t>11/16/2016</a:t>
             </a:fld>
             <a:endParaRPr lang="en-US"/>
           </a:p>
@@ -1498,7 +1498,6 @@
               <a:rPr lang="en-US"/>
               <a:t>Click to edit Master title style</a:t>
             </a:r>
-            <a:endParaRPr lang="en-US"/>
           </a:p>
         </p:txBody>
       </p:sp>
@@ -1550,7 +1549,6 @@
               <a:rPr lang="en-US"/>
               <a:t>Fifth level</a:t>
             </a:r>
-            <a:endParaRPr lang="en-US"/>
           </a:p>
         </p:txBody>
       </p:sp>
@@ -1571,7 +1569,7 @@
           <a:p>
             <a:fld id="{BD7867F7-6ED0-4676-9C58-D45A04AA3FAF}" type="datetimeFigureOut">
               <a:rPr lang="en-US" smtClean="0"/>
-              <a:t>11/15/2016</a:t>
+              <a:t>11/16/2016</a:t>
             </a:fld>
             <a:endParaRPr lang="en-US"/>
           </a:p>
@@ -1677,7 +1675,6 @@
               <a:rPr lang="en-US"/>
               <a:t>Click to edit Master title style</a:t>
             </a:r>
-            <a:endParaRPr lang="en-US"/>
           </a:p>
         </p:txBody>
       </p:sp>
@@ -1817,7 +1814,7 @@
           <a:p>
             <a:fld id="{BD7867F7-6ED0-4676-9C58-D45A04AA3FAF}" type="datetimeFigureOut">
               <a:rPr lang="en-US" smtClean="0"/>
-              <a:t>11/15/2016</a:t>
+              <a:t>11/16/2016</a:t>
             </a:fld>
             <a:endParaRPr lang="en-US"/>
           </a:p>
@@ -1914,7 +1911,6 @@
               <a:rPr lang="en-US"/>
               <a:t>Click to edit Master title style</a:t>
             </a:r>
-            <a:endParaRPr lang="en-US"/>
           </a:p>
         </p:txBody>
       </p:sp>
@@ -1971,7 +1967,6 @@
               <a:rPr lang="en-US"/>
               <a:t>Fifth level</a:t>
             </a:r>
-            <a:endParaRPr lang="en-US"/>
           </a:p>
         </p:txBody>
       </p:sp>
@@ -2028,7 +2023,6 @@
               <a:rPr lang="en-US"/>
               <a:t>Fifth level</a:t>
             </a:r>
-            <a:endParaRPr lang="en-US"/>
           </a:p>
         </p:txBody>
       </p:sp>
@@ -2049,7 +2043,7 @@
           <a:p>
             <a:fld id="{BD7867F7-6ED0-4676-9C58-D45A04AA3FAF}" type="datetimeFigureOut">
               <a:rPr lang="en-US" smtClean="0"/>
-              <a:t>11/15/2016</a:t>
+              <a:t>11/16/2016</a:t>
             </a:fld>
             <a:endParaRPr lang="en-US"/>
           </a:p>
@@ -2151,7 +2145,6 @@
               <a:rPr lang="en-US"/>
               <a:t>Click to edit Master title style</a:t>
             </a:r>
-            <a:endParaRPr lang="en-US"/>
           </a:p>
         </p:txBody>
       </p:sp>
@@ -2273,7 +2266,6 @@
               <a:rPr lang="en-US"/>
               <a:t>Fifth level</a:t>
             </a:r>
-            <a:endParaRPr lang="en-US"/>
           </a:p>
         </p:txBody>
       </p:sp>
@@ -2395,7 +2387,6 @@
               <a:rPr lang="en-US"/>
               <a:t>Fifth level</a:t>
             </a:r>
-            <a:endParaRPr lang="en-US"/>
           </a:p>
         </p:txBody>
       </p:sp>
@@ -2416,7 +2407,7 @@
           <a:p>
             <a:fld id="{BD7867F7-6ED0-4676-9C58-D45A04AA3FAF}" type="datetimeFigureOut">
               <a:rPr lang="en-US" smtClean="0"/>
-              <a:t>11/15/2016</a:t>
+              <a:t>11/16/2016</a:t>
             </a:fld>
             <a:endParaRPr lang="en-US"/>
           </a:p>
@@ -2513,7 +2504,6 @@
               <a:rPr lang="en-US"/>
               <a:t>Click to edit Master title style</a:t>
             </a:r>
-            <a:endParaRPr lang="en-US"/>
           </a:p>
         </p:txBody>
       </p:sp>
@@ -2534,7 +2524,7 @@
           <a:p>
             <a:fld id="{BD7867F7-6ED0-4676-9C58-D45A04AA3FAF}" type="datetimeFigureOut">
               <a:rPr lang="en-US" smtClean="0"/>
-              <a:t>11/15/2016</a:t>
+              <a:t>11/16/2016</a:t>
             </a:fld>
             <a:endParaRPr lang="en-US"/>
           </a:p>
@@ -2629,7 +2619,7 @@
           <a:p>
             <a:fld id="{BD7867F7-6ED0-4676-9C58-D45A04AA3FAF}" type="datetimeFigureOut">
               <a:rPr lang="en-US" smtClean="0"/>
-              <a:t>11/15/2016</a:t>
+              <a:t>11/16/2016</a:t>
             </a:fld>
             <a:endParaRPr lang="en-US"/>
           </a:p>
@@ -2735,7 +2725,6 @@
               <a:rPr lang="en-US"/>
               <a:t>Click to edit Master title style</a:t>
             </a:r>
-            <a:endParaRPr lang="en-US"/>
           </a:p>
         </p:txBody>
       </p:sp>
@@ -2820,7 +2809,6 @@
               <a:rPr lang="en-US"/>
               <a:t>Fifth level</a:t>
             </a:r>
-            <a:endParaRPr lang="en-US"/>
           </a:p>
         </p:txBody>
       </p:sp>
@@ -2906,7 +2894,7 @@
           <a:p>
             <a:fld id="{BD7867F7-6ED0-4676-9C58-D45A04AA3FAF}" type="datetimeFigureOut">
               <a:rPr lang="en-US" smtClean="0"/>
-              <a:t>11/15/2016</a:t>
+              <a:t>11/16/2016</a:t>
             </a:fld>
             <a:endParaRPr lang="en-US"/>
           </a:p>
@@ -3012,7 +3000,6 @@
               <a:rPr lang="en-US"/>
               <a:t>Click to edit Master title style</a:t>
             </a:r>
-            <a:endParaRPr lang="en-US"/>
           </a:p>
         </p:txBody>
       </p:sp>
@@ -3159,7 +3146,7 @@
           <a:p>
             <a:fld id="{BD7867F7-6ED0-4676-9C58-D45A04AA3FAF}" type="datetimeFigureOut">
               <a:rPr lang="en-US" smtClean="0"/>
-              <a:t>11/15/2016</a:t>
+              <a:t>11/16/2016</a:t>
             </a:fld>
             <a:endParaRPr lang="en-US"/>
           </a:p>
@@ -3271,7 +3258,6 @@
               <a:rPr lang="en-US"/>
               <a:t>Click to edit Master title style</a:t>
             </a:r>
-            <a:endParaRPr lang="en-US"/>
           </a:p>
         </p:txBody>
       </p:sp>
@@ -3333,7 +3319,6 @@
               <a:rPr lang="en-US"/>
               <a:t>Fifth level</a:t>
             </a:r>
-            <a:endParaRPr lang="en-US"/>
           </a:p>
         </p:txBody>
       </p:sp>
@@ -3372,7 +3357,7 @@
           <a:p>
             <a:fld id="{BD7867F7-6ED0-4676-9C58-D45A04AA3FAF}" type="datetimeFigureOut">
               <a:rPr lang="en-US" smtClean="0"/>
-              <a:t>11/15/2016</a:t>
+              <a:t>11/16/2016</a:t>
             </a:fld>
             <a:endParaRPr lang="en-US"/>
           </a:p>
@@ -4655,8 +4640,8 @@
         </p:nvSpPr>
         <p:spPr>
           <a:xfrm>
-            <a:off x="1282535" y="154381"/>
-            <a:ext cx="9097362" cy="3139321"/>
+            <a:off x="1128156" y="368136"/>
+            <a:ext cx="9533379" cy="369332"/>
           </a:xfrm>
           <a:prstGeom prst="rect">
             <a:avLst/>
@@ -4674,83 +4659,8 @@
                 <a:latin typeface="Arial" panose="020B0604020202020204" pitchFamily="34" charset="0"/>
                 <a:cs typeface="Arial" panose="020B0604020202020204" pitchFamily="34" charset="0"/>
               </a:rPr>
-              <a:t>Compare and Swap takes an “optimistic” approach to multi-tasking.</a:t>
-            </a:r>
-          </a:p>
-          <a:p>
-            <a:endParaRPr lang="en-US" dirty="0">
-              <a:latin typeface="Arial" panose="020B0604020202020204" pitchFamily="34" charset="0"/>
-              <a:cs typeface="Arial" panose="020B0604020202020204" pitchFamily="34" charset="0"/>
-            </a:endParaRPr>
-          </a:p>
-          <a:p>
-            <a:r>
-              <a:rPr lang="en-US" dirty="0">
-                <a:latin typeface="Arial" panose="020B0604020202020204" pitchFamily="34" charset="0"/>
-                <a:cs typeface="Arial" panose="020B0604020202020204" pitchFamily="34" charset="0"/>
-              </a:rPr>
-              <a:t>Rather than locking, perform the calculation and then see if anything has changed.</a:t>
-            </a:r>
-          </a:p>
-          <a:p>
-            <a:r>
-              <a:rPr lang="en-US" dirty="0">
-                <a:latin typeface="Arial" panose="020B0604020202020204" pitchFamily="34" charset="0"/>
-                <a:cs typeface="Arial" panose="020B0604020202020204" pitchFamily="34" charset="0"/>
-              </a:rPr>
-              <a:t>If it’s changed, you can try again (or not…)</a:t>
-            </a:r>
-          </a:p>
-          <a:p>
-            <a:endParaRPr lang="en-US" dirty="0">
-              <a:latin typeface="Arial" panose="020B0604020202020204" pitchFamily="34" charset="0"/>
-              <a:cs typeface="Arial" panose="020B0604020202020204" pitchFamily="34" charset="0"/>
-            </a:endParaRPr>
-          </a:p>
-          <a:p>
-            <a:r>
-              <a:rPr lang="en-US" dirty="0">
-                <a:latin typeface="Arial" panose="020B0604020202020204" pitchFamily="34" charset="0"/>
-                <a:cs typeface="Arial" panose="020B0604020202020204" pitchFamily="34" charset="0"/>
-              </a:rPr>
-              <a:t>It is better to “beg forgiveness than ask permission”</a:t>
-            </a:r>
-          </a:p>
-          <a:p>
-            <a:endParaRPr lang="en-US" dirty="0">
-              <a:latin typeface="Arial" panose="020B0604020202020204" pitchFamily="34" charset="0"/>
-              <a:cs typeface="Arial" panose="020B0604020202020204" pitchFamily="34" charset="0"/>
-            </a:endParaRPr>
-          </a:p>
-          <a:p>
-            <a:r>
-              <a:rPr lang="en-US" dirty="0">
-                <a:latin typeface="Arial" panose="020B0604020202020204" pitchFamily="34" charset="0"/>
-                <a:cs typeface="Arial" panose="020B0604020202020204" pitchFamily="34" charset="0"/>
-              </a:rPr>
-              <a:t>Compare and Swap is implemented at the hardware level meaning it can be very fast…</a:t>
-            </a:r>
-          </a:p>
-          <a:p>
-            <a:r>
-              <a:rPr lang="en-US" dirty="0">
-                <a:latin typeface="Arial" panose="020B0604020202020204" pitchFamily="34" charset="0"/>
-                <a:cs typeface="Arial" panose="020B0604020202020204" pitchFamily="34" charset="0"/>
-              </a:rPr>
-              <a:t>Avoids explicit synchronization…</a:t>
-            </a:r>
-          </a:p>
-          <a:p>
-            <a:endParaRPr lang="en-US" dirty="0">
-              <a:latin typeface="Arial" panose="020B0604020202020204" pitchFamily="34" charset="0"/>
-              <a:cs typeface="Arial" panose="020B0604020202020204" pitchFamily="34" charset="0"/>
-            </a:endParaRPr>
-          </a:p>
-          <a:p>
-            <a:endParaRPr lang="en-US" dirty="0">
-              <a:latin typeface="Arial" panose="020B0604020202020204" pitchFamily="34" charset="0"/>
-              <a:cs typeface="Arial" panose="020B0604020202020204" pitchFamily="34" charset="0"/>
-            </a:endParaRPr>
+              <a:t>How could you ensure that a clear() actually cleared the map (that clear wasn’t approximate)</a:t>
+            </a:r>
           </a:p>
         </p:txBody>
       </p:sp>
@@ -4770,18 +4680,153 @@
         </p:blipFill>
         <p:spPr>
           <a:xfrm>
-            <a:off x="2297254" y="2658875"/>
-            <a:ext cx="7067923" cy="4199125"/>
+            <a:off x="954046" y="1491217"/>
+            <a:ext cx="10096326" cy="2249509"/>
           </a:xfrm>
           <a:prstGeom prst="rect">
             <a:avLst/>
           </a:prstGeom>
         </p:spPr>
       </p:pic>
+      <p:cxnSp>
+        <p:nvCxnSpPr>
+          <p:cNvPr id="7" name="Straight Arrow Connector 6"/>
+          <p:cNvCxnSpPr/>
+          <p:nvPr/>
+        </p:nvCxnSpPr>
+        <p:spPr>
+          <a:xfrm flipH="1" flipV="1">
+            <a:off x="3705100" y="2588821"/>
+            <a:ext cx="546265" cy="11875"/>
+          </a:xfrm>
+          <a:prstGeom prst="straightConnector1">
+            <a:avLst/>
+          </a:prstGeom>
+          <a:ln>
+            <a:tailEnd type="triangle"/>
+          </a:ln>
+        </p:spPr>
+        <p:style>
+          <a:lnRef idx="1">
+            <a:schemeClr val="accent1"/>
+          </a:lnRef>
+          <a:fillRef idx="0">
+            <a:schemeClr val="accent1"/>
+          </a:fillRef>
+          <a:effectRef idx="0">
+            <a:schemeClr val="accent1"/>
+          </a:effectRef>
+          <a:fontRef idx="minor">
+            <a:schemeClr val="tx1"/>
+          </a:fontRef>
+        </p:style>
+      </p:cxnSp>
+      <p:sp>
+        <p:nvSpPr>
+          <p:cNvPr id="8" name="TextBox 7"/>
+          <p:cNvSpPr txBox="1"/>
+          <p:nvPr/>
+        </p:nvSpPr>
+        <p:spPr>
+          <a:xfrm>
+            <a:off x="4358245" y="2473469"/>
+            <a:ext cx="7609776" cy="1754326"/>
+          </a:xfrm>
+          <a:prstGeom prst="rect">
+            <a:avLst/>
+          </a:prstGeom>
+          <a:noFill/>
+        </p:spPr>
+        <p:txBody>
+          <a:bodyPr wrap="none" rtlCol="0">
+            <a:spAutoFit/>
+          </a:bodyPr>
+          <a:lstStyle/>
+          <a:p>
+            <a:r>
+              <a:rPr lang="en-US" dirty="0">
+                <a:latin typeface="Arial" panose="020B0604020202020204" pitchFamily="34" charset="0"/>
+                <a:cs typeface="Arial" panose="020B0604020202020204" pitchFamily="34" charset="0"/>
+              </a:rPr>
+              <a:t>If every client that has a reference to </a:t>
+            </a:r>
+            <a:r>
+              <a:rPr lang="en-US" dirty="0" err="1">
+                <a:latin typeface="Arial" panose="020B0604020202020204" pitchFamily="34" charset="0"/>
+                <a:cs typeface="Arial" panose="020B0604020202020204" pitchFamily="34" charset="0"/>
+              </a:rPr>
+              <a:t>myMap</a:t>
+            </a:r>
+            <a:r>
+              <a:rPr lang="en-US" dirty="0">
+                <a:latin typeface="Arial" panose="020B0604020202020204" pitchFamily="34" charset="0"/>
+                <a:cs typeface="Arial" panose="020B0604020202020204" pitchFamily="34" charset="0"/>
+              </a:rPr>
+              <a:t> uses synchronized,</a:t>
+            </a:r>
+          </a:p>
+          <a:p>
+            <a:r>
+              <a:rPr lang="en-US" dirty="0">
+                <a:latin typeface="Arial" panose="020B0604020202020204" pitchFamily="34" charset="0"/>
+                <a:cs typeface="Arial" panose="020B0604020202020204" pitchFamily="34" charset="0"/>
+              </a:rPr>
+              <a:t>then only one thread is working at a time, and clear will be guaranteed</a:t>
+            </a:r>
+          </a:p>
+          <a:p>
+            <a:r>
+              <a:rPr lang="en-US" dirty="0">
+                <a:latin typeface="Arial" panose="020B0604020202020204" pitchFamily="34" charset="0"/>
+                <a:cs typeface="Arial" panose="020B0604020202020204" pitchFamily="34" charset="0"/>
+              </a:rPr>
+              <a:t>to clear the map…</a:t>
+            </a:r>
+          </a:p>
+          <a:p>
+            <a:endParaRPr lang="en-US" dirty="0">
+              <a:latin typeface="Arial" panose="020B0604020202020204" pitchFamily="34" charset="0"/>
+              <a:cs typeface="Arial" panose="020B0604020202020204" pitchFamily="34" charset="0"/>
+            </a:endParaRPr>
+          </a:p>
+          <a:p>
+            <a:r>
+              <a:rPr lang="en-US" dirty="0">
+                <a:latin typeface="Arial" panose="020B0604020202020204" pitchFamily="34" charset="0"/>
+                <a:cs typeface="Arial" panose="020B0604020202020204" pitchFamily="34" charset="0"/>
+              </a:rPr>
+              <a:t>But it would only take one thread ignoring the synchronized(</a:t>
+            </a:r>
+            <a:r>
+              <a:rPr lang="en-US" dirty="0" err="1">
+                <a:latin typeface="Arial" panose="020B0604020202020204" pitchFamily="34" charset="0"/>
+                <a:cs typeface="Arial" panose="020B0604020202020204" pitchFamily="34" charset="0"/>
+              </a:rPr>
+              <a:t>myMap</a:t>
+            </a:r>
+            <a:r>
+              <a:rPr lang="en-US" dirty="0">
+                <a:latin typeface="Arial" panose="020B0604020202020204" pitchFamily="34" charset="0"/>
+                <a:cs typeface="Arial" panose="020B0604020202020204" pitchFamily="34" charset="0"/>
+              </a:rPr>
+              <a:t>) lock</a:t>
+            </a:r>
+          </a:p>
+          <a:p>
+            <a:r>
+              <a:rPr lang="en-US" dirty="0">
+                <a:latin typeface="Arial" panose="020B0604020202020204" pitchFamily="34" charset="0"/>
+                <a:cs typeface="Arial" panose="020B0604020202020204" pitchFamily="34" charset="0"/>
+              </a:rPr>
+              <a:t>to push clear() back to being approximate…</a:t>
+            </a:r>
+          </a:p>
+        </p:txBody>
+      </p:sp>
     </p:spTree>
     <p:extLst>
       <p:ext uri="{BB962C8B-B14F-4D97-AF65-F5344CB8AC3E}">
-        <p14:creationId xmlns:p14="http://schemas.microsoft.com/office/powerpoint/2010/main" val="4038035447"/>
+        <p14:creationId xmlns:p14="http://schemas.microsoft.com/office/powerpoint/2010/main" val="781172978"/>
       </p:ext>
     </p:extLst>
   </p:cSld>
@@ -4816,8 +4861,8 @@
         </p:nvSpPr>
         <p:spPr>
           <a:xfrm>
-            <a:off x="1306286" y="142504"/>
-            <a:ext cx="9494907" cy="646331"/>
+            <a:off x="1258784" y="130629"/>
+            <a:ext cx="8426217" cy="923330"/>
           </a:xfrm>
           <a:prstGeom prst="rect">
             <a:avLst/>
@@ -4835,17 +4880,34 @@
                 <a:latin typeface="Arial" panose="020B0604020202020204" pitchFamily="34" charset="0"/>
                 <a:cs typeface="Arial" panose="020B0604020202020204" pitchFamily="34" charset="0"/>
               </a:rPr>
-              <a:t>This is what compare and swap does (but not how it really works since the CPU can do this</a:t>
-            </a:r>
-          </a:p>
-          <a:p>
+              <a:t>Alternatively, if you are implementing a striped map, you could </a:t>
+            </a:r>
+            <a:r>
+              <a:rPr lang="en-US" dirty="0" err="1">
+                <a:latin typeface="Arial" panose="020B0604020202020204" pitchFamily="34" charset="0"/>
+                <a:cs typeface="Arial" panose="020B0604020202020204" pitchFamily="34" charset="0"/>
+              </a:rPr>
+              <a:t>ReentrantLocks</a:t>
+            </a:r>
             <a:r>
               <a:rPr lang="en-US" dirty="0">
                 <a:latin typeface="Arial" panose="020B0604020202020204" pitchFamily="34" charset="0"/>
                 <a:cs typeface="Arial" panose="020B0604020202020204" pitchFamily="34" charset="0"/>
               </a:rPr>
-              <a:t>without explicit synchronization)</a:t>
-            </a:r>
+              <a:t>…</a:t>
+            </a:r>
+          </a:p>
+          <a:p>
+            <a:endParaRPr lang="en-US" dirty="0">
+              <a:latin typeface="Arial" panose="020B0604020202020204" pitchFamily="34" charset="0"/>
+              <a:cs typeface="Arial" panose="020B0604020202020204" pitchFamily="34" charset="0"/>
+            </a:endParaRPr>
+          </a:p>
+          <a:p>
+            <a:endParaRPr lang="en-US" dirty="0">
+              <a:latin typeface="Arial" panose="020B0604020202020204" pitchFamily="34" charset="0"/>
+              <a:cs typeface="Arial" panose="020B0604020202020204" pitchFamily="34" charset="0"/>
+            </a:endParaRPr>
           </a:p>
         </p:txBody>
       </p:sp>
@@ -4865,18 +4927,375 @@
         </p:blipFill>
         <p:spPr>
           <a:xfrm>
-            <a:off x="2320760" y="922812"/>
-            <a:ext cx="7126532" cy="4456710"/>
+            <a:off x="795647" y="860465"/>
+            <a:ext cx="8640323" cy="3521529"/>
           </a:xfrm>
           <a:prstGeom prst="rect">
             <a:avLst/>
           </a:prstGeom>
         </p:spPr>
       </p:pic>
+      <p:cxnSp>
+        <p:nvCxnSpPr>
+          <p:cNvPr id="7" name="Straight Arrow Connector 6"/>
+          <p:cNvCxnSpPr/>
+          <p:nvPr/>
+        </p:nvCxnSpPr>
+        <p:spPr>
+          <a:xfrm flipH="1">
+            <a:off x="4108862" y="1365662"/>
+            <a:ext cx="1363030" cy="59377"/>
+          </a:xfrm>
+          <a:prstGeom prst="straightConnector1">
+            <a:avLst/>
+          </a:prstGeom>
+          <a:ln>
+            <a:tailEnd type="triangle"/>
+          </a:ln>
+        </p:spPr>
+        <p:style>
+          <a:lnRef idx="1">
+            <a:schemeClr val="accent1"/>
+          </a:lnRef>
+          <a:fillRef idx="0">
+            <a:schemeClr val="accent1"/>
+          </a:fillRef>
+          <a:effectRef idx="0">
+            <a:schemeClr val="accent1"/>
+          </a:effectRef>
+          <a:fontRef idx="minor">
+            <a:schemeClr val="tx1"/>
+          </a:fontRef>
+        </p:style>
+      </p:cxnSp>
+      <p:sp>
+        <p:nvSpPr>
+          <p:cNvPr id="8" name="TextBox 7"/>
+          <p:cNvSpPr txBox="1"/>
+          <p:nvPr/>
+        </p:nvSpPr>
+        <p:spPr>
+          <a:xfrm>
+            <a:off x="5581404" y="1246911"/>
+            <a:ext cx="6237605" cy="646331"/>
+          </a:xfrm>
+          <a:prstGeom prst="rect">
+            <a:avLst/>
+          </a:prstGeom>
+          <a:noFill/>
+        </p:spPr>
+        <p:txBody>
+          <a:bodyPr wrap="none" rtlCol="0">
+            <a:spAutoFit/>
+          </a:bodyPr>
+          <a:lstStyle/>
+          <a:p>
+            <a:r>
+              <a:rPr lang="en-US" dirty="0">
+                <a:latin typeface="Arial" panose="020B0604020202020204" pitchFamily="34" charset="0"/>
+                <a:cs typeface="Arial" panose="020B0604020202020204" pitchFamily="34" charset="0"/>
+              </a:rPr>
+              <a:t>As long as no other methods hold more than one lock,</a:t>
+            </a:r>
+          </a:p>
+          <a:p>
+            <a:r>
+              <a:rPr lang="en-US" dirty="0">
+                <a:latin typeface="Arial" panose="020B0604020202020204" pitchFamily="34" charset="0"/>
+                <a:cs typeface="Arial" panose="020B0604020202020204" pitchFamily="34" charset="0"/>
+              </a:rPr>
+              <a:t>this won’t deadlock as locks are acquired in the same order</a:t>
+            </a:r>
+          </a:p>
+        </p:txBody>
+      </p:sp>
+      <p:sp>
+        <p:nvSpPr>
+          <p:cNvPr id="9" name="TextBox 8"/>
+          <p:cNvSpPr txBox="1"/>
+          <p:nvPr/>
+        </p:nvSpPr>
+        <p:spPr>
+          <a:xfrm>
+            <a:off x="439387" y="4354756"/>
+            <a:ext cx="3762568" cy="1200329"/>
+          </a:xfrm>
+          <a:prstGeom prst="rect">
+            <a:avLst/>
+          </a:prstGeom>
+          <a:noFill/>
+        </p:spPr>
+        <p:txBody>
+          <a:bodyPr wrap="none" rtlCol="0">
+            <a:spAutoFit/>
+          </a:bodyPr>
+          <a:lstStyle/>
+          <a:p>
+            <a:r>
+              <a:rPr lang="en-US" dirty="0">
+                <a:latin typeface="Arial" panose="020B0604020202020204" pitchFamily="34" charset="0"/>
+                <a:cs typeface="Arial" panose="020B0604020202020204" pitchFamily="34" charset="0"/>
+              </a:rPr>
+              <a:t>A client can then call</a:t>
+            </a:r>
+          </a:p>
+          <a:p>
+            <a:r>
+              <a:rPr lang="en-US" dirty="0">
+                <a:latin typeface="Arial" panose="020B0604020202020204" pitchFamily="34" charset="0"/>
+                <a:cs typeface="Arial" panose="020B0604020202020204" pitchFamily="34" charset="0"/>
+              </a:rPr>
+              <a:t>	</a:t>
+            </a:r>
+            <a:r>
+              <a:rPr lang="en-US" dirty="0" err="1">
+                <a:latin typeface="Arial" panose="020B0604020202020204" pitchFamily="34" charset="0"/>
+                <a:cs typeface="Arial" panose="020B0604020202020204" pitchFamily="34" charset="0"/>
+              </a:rPr>
+              <a:t>myMap.acquireAllLocks</a:t>
+            </a:r>
+            <a:r>
+              <a:rPr lang="en-US" dirty="0">
+                <a:latin typeface="Arial" panose="020B0604020202020204" pitchFamily="34" charset="0"/>
+                <a:cs typeface="Arial" panose="020B0604020202020204" pitchFamily="34" charset="0"/>
+              </a:rPr>
+              <a:t>();</a:t>
+            </a:r>
+          </a:p>
+          <a:p>
+            <a:r>
+              <a:rPr lang="en-US" dirty="0">
+                <a:latin typeface="Arial" panose="020B0604020202020204" pitchFamily="34" charset="0"/>
+                <a:cs typeface="Arial" panose="020B0604020202020204" pitchFamily="34" charset="0"/>
+              </a:rPr>
+              <a:t>	</a:t>
+            </a:r>
+            <a:r>
+              <a:rPr lang="en-US" dirty="0" err="1">
+                <a:latin typeface="Arial" panose="020B0604020202020204" pitchFamily="34" charset="0"/>
+                <a:cs typeface="Arial" panose="020B0604020202020204" pitchFamily="34" charset="0"/>
+              </a:rPr>
+              <a:t>myMap.clear</a:t>
+            </a:r>
+            <a:r>
+              <a:rPr lang="en-US" dirty="0">
+                <a:latin typeface="Arial" panose="020B0604020202020204" pitchFamily="34" charset="0"/>
+                <a:cs typeface="Arial" panose="020B0604020202020204" pitchFamily="34" charset="0"/>
+              </a:rPr>
+              <a:t>();</a:t>
+            </a:r>
+          </a:p>
+          <a:p>
+            <a:r>
+              <a:rPr lang="en-US" dirty="0">
+                <a:latin typeface="Arial" panose="020B0604020202020204" pitchFamily="34" charset="0"/>
+                <a:cs typeface="Arial" panose="020B0604020202020204" pitchFamily="34" charset="0"/>
+              </a:rPr>
+              <a:t>	</a:t>
+            </a:r>
+            <a:r>
+              <a:rPr lang="en-US" dirty="0" err="1">
+                <a:latin typeface="Arial" panose="020B0604020202020204" pitchFamily="34" charset="0"/>
+                <a:cs typeface="Arial" panose="020B0604020202020204" pitchFamily="34" charset="0"/>
+              </a:rPr>
+              <a:t>myMap.releaseAllLocks</a:t>
+            </a:r>
+            <a:r>
+              <a:rPr lang="en-US" dirty="0">
+                <a:latin typeface="Arial" panose="020B0604020202020204" pitchFamily="34" charset="0"/>
+                <a:cs typeface="Arial" panose="020B0604020202020204" pitchFamily="34" charset="0"/>
+              </a:rPr>
+              <a:t>();</a:t>
+            </a:r>
+          </a:p>
+        </p:txBody>
+      </p:sp>
+      <p:sp>
+        <p:nvSpPr>
+          <p:cNvPr id="10" name="TextBox 9"/>
+          <p:cNvSpPr txBox="1"/>
+          <p:nvPr/>
+        </p:nvSpPr>
+        <p:spPr>
+          <a:xfrm>
+            <a:off x="605642" y="5593279"/>
+            <a:ext cx="3057825" cy="369332"/>
+          </a:xfrm>
+          <a:prstGeom prst="rect">
+            <a:avLst/>
+          </a:prstGeom>
+          <a:noFill/>
+        </p:spPr>
+        <p:txBody>
+          <a:bodyPr wrap="none" rtlCol="0">
+            <a:spAutoFit/>
+          </a:bodyPr>
+          <a:lstStyle/>
+          <a:p>
+            <a:r>
+              <a:rPr lang="en-US" dirty="0"/>
+              <a:t>and clear() will empty the map</a:t>
+            </a:r>
+          </a:p>
+        </p:txBody>
+      </p:sp>
+      <p:sp>
+        <p:nvSpPr>
+          <p:cNvPr id="11" name="TextBox 10"/>
+          <p:cNvSpPr txBox="1"/>
+          <p:nvPr/>
+        </p:nvSpPr>
+        <p:spPr>
+          <a:xfrm>
+            <a:off x="5296395" y="4532886"/>
+            <a:ext cx="3467616" cy="1200329"/>
+          </a:xfrm>
+          <a:prstGeom prst="rect">
+            <a:avLst/>
+          </a:prstGeom>
+          <a:noFill/>
+        </p:spPr>
+        <p:txBody>
+          <a:bodyPr wrap="none" rtlCol="0">
+            <a:spAutoFit/>
+          </a:bodyPr>
+          <a:lstStyle/>
+          <a:p>
+            <a:r>
+              <a:rPr lang="en-US" dirty="0">
+                <a:latin typeface="Arial" panose="020B0604020202020204" pitchFamily="34" charset="0"/>
+                <a:cs typeface="Arial" panose="020B0604020202020204" pitchFamily="34" charset="0"/>
+              </a:rPr>
+              <a:t>If the client just calls</a:t>
+            </a:r>
+          </a:p>
+          <a:p>
+            <a:r>
+              <a:rPr lang="en-US" dirty="0">
+                <a:latin typeface="Arial" panose="020B0604020202020204" pitchFamily="34" charset="0"/>
+                <a:cs typeface="Arial" panose="020B0604020202020204" pitchFamily="34" charset="0"/>
+              </a:rPr>
+              <a:t>	</a:t>
+            </a:r>
+            <a:r>
+              <a:rPr lang="en-US" dirty="0" err="1">
+                <a:latin typeface="Arial" panose="020B0604020202020204" pitchFamily="34" charset="0"/>
+                <a:cs typeface="Arial" panose="020B0604020202020204" pitchFamily="34" charset="0"/>
+              </a:rPr>
+              <a:t>myMap.clear</a:t>
+            </a:r>
+            <a:r>
+              <a:rPr lang="en-US" dirty="0">
+                <a:latin typeface="Arial" panose="020B0604020202020204" pitchFamily="34" charset="0"/>
+                <a:cs typeface="Arial" panose="020B0604020202020204" pitchFamily="34" charset="0"/>
+              </a:rPr>
+              <a:t>()</a:t>
+            </a:r>
+          </a:p>
+          <a:p>
+            <a:endParaRPr lang="en-US" dirty="0">
+              <a:latin typeface="Arial" panose="020B0604020202020204" pitchFamily="34" charset="0"/>
+              <a:cs typeface="Arial" panose="020B0604020202020204" pitchFamily="34" charset="0"/>
+            </a:endParaRPr>
+          </a:p>
+          <a:p>
+            <a:r>
+              <a:rPr lang="en-US" dirty="0">
+                <a:latin typeface="Arial" panose="020B0604020202020204" pitchFamily="34" charset="0"/>
+                <a:cs typeface="Arial" panose="020B0604020202020204" pitchFamily="34" charset="0"/>
+              </a:rPr>
+              <a:t>Then clear() will be approximate</a:t>
+            </a:r>
+          </a:p>
+        </p:txBody>
+      </p:sp>
+      <p:cxnSp>
+        <p:nvCxnSpPr>
+          <p:cNvPr id="13" name="Straight Arrow Connector 12"/>
+          <p:cNvCxnSpPr/>
+          <p:nvPr/>
+        </p:nvCxnSpPr>
+        <p:spPr>
+          <a:xfrm flipH="1">
+            <a:off x="4108862" y="2621229"/>
+            <a:ext cx="581891" cy="110096"/>
+          </a:xfrm>
+          <a:prstGeom prst="straightConnector1">
+            <a:avLst/>
+          </a:prstGeom>
+          <a:ln>
+            <a:tailEnd type="triangle"/>
+          </a:ln>
+        </p:spPr>
+        <p:style>
+          <a:lnRef idx="1">
+            <a:schemeClr val="accent1"/>
+          </a:lnRef>
+          <a:fillRef idx="0">
+            <a:schemeClr val="accent1"/>
+          </a:fillRef>
+          <a:effectRef idx="0">
+            <a:schemeClr val="accent1"/>
+          </a:effectRef>
+          <a:fontRef idx="minor">
+            <a:schemeClr val="tx1"/>
+          </a:fontRef>
+        </p:style>
+      </p:cxnSp>
+      <p:sp>
+        <p:nvSpPr>
+          <p:cNvPr id="14" name="TextBox 13"/>
+          <p:cNvSpPr txBox="1"/>
+          <p:nvPr/>
+        </p:nvSpPr>
+        <p:spPr>
+          <a:xfrm>
+            <a:off x="4940135" y="2621229"/>
+            <a:ext cx="7297832" cy="923330"/>
+          </a:xfrm>
+          <a:prstGeom prst="rect">
+            <a:avLst/>
+          </a:prstGeom>
+          <a:noFill/>
+        </p:spPr>
+        <p:txBody>
+          <a:bodyPr wrap="none" rtlCol="0">
+            <a:spAutoFit/>
+          </a:bodyPr>
+          <a:lstStyle/>
+          <a:p>
+            <a:r>
+              <a:rPr lang="en-US" dirty="0">
+                <a:latin typeface="Arial" panose="020B0604020202020204" pitchFamily="34" charset="0"/>
+                <a:cs typeface="Arial" panose="020B0604020202020204" pitchFamily="34" charset="0"/>
+              </a:rPr>
+              <a:t>If you forget to call this or call it when you don’t have all the locks,</a:t>
+            </a:r>
+          </a:p>
+          <a:p>
+            <a:r>
+              <a:rPr lang="en-US" dirty="0">
+                <a:latin typeface="Arial" panose="020B0604020202020204" pitchFamily="34" charset="0"/>
+                <a:cs typeface="Arial" panose="020B0604020202020204" pitchFamily="34" charset="0"/>
+              </a:rPr>
+              <a:t>your application will crash.   (We could use try…catch to make it more</a:t>
+            </a:r>
+          </a:p>
+          <a:p>
+            <a:r>
+              <a:rPr lang="en-US" dirty="0">
+                <a:latin typeface="Arial" panose="020B0604020202020204" pitchFamily="34" charset="0"/>
+                <a:cs typeface="Arial" panose="020B0604020202020204" pitchFamily="34" charset="0"/>
+              </a:rPr>
+              <a:t>robust…)</a:t>
+            </a:r>
+          </a:p>
+        </p:txBody>
+      </p:sp>
     </p:spTree>
     <p:extLst>
       <p:ext uri="{BB962C8B-B14F-4D97-AF65-F5344CB8AC3E}">
-        <p14:creationId xmlns:p14="http://schemas.microsoft.com/office/powerpoint/2010/main" val="3549752082"/>
+        <p14:creationId xmlns:p14="http://schemas.microsoft.com/office/powerpoint/2010/main" val="836821911"/>
       </p:ext>
     </p:extLst>
   </p:cSld>
@@ -4903,9 +5322,116 @@
           <a:chExt cx="0" cy="0"/>
         </a:xfrm>
       </p:grpSpPr>
+      <p:sp>
+        <p:nvSpPr>
+          <p:cNvPr id="4" name="TextBox 3"/>
+          <p:cNvSpPr txBox="1"/>
+          <p:nvPr/>
+        </p:nvSpPr>
+        <p:spPr>
+          <a:xfrm>
+            <a:off x="1282535" y="154381"/>
+            <a:ext cx="9097362" cy="3139321"/>
+          </a:xfrm>
+          <a:prstGeom prst="rect">
+            <a:avLst/>
+          </a:prstGeom>
+          <a:noFill/>
+        </p:spPr>
+        <p:txBody>
+          <a:bodyPr wrap="none" rtlCol="0">
+            <a:spAutoFit/>
+          </a:bodyPr>
+          <a:lstStyle/>
+          <a:p>
+            <a:r>
+              <a:rPr lang="en-US" dirty="0">
+                <a:latin typeface="Arial" panose="020B0604020202020204" pitchFamily="34" charset="0"/>
+                <a:cs typeface="Arial" panose="020B0604020202020204" pitchFamily="34" charset="0"/>
+              </a:rPr>
+              <a:t>Compare and Swap takes an “optimistic” approach to multi-tasking.</a:t>
+            </a:r>
+          </a:p>
+          <a:p>
+            <a:endParaRPr lang="en-US" dirty="0">
+              <a:latin typeface="Arial" panose="020B0604020202020204" pitchFamily="34" charset="0"/>
+              <a:cs typeface="Arial" panose="020B0604020202020204" pitchFamily="34" charset="0"/>
+            </a:endParaRPr>
+          </a:p>
+          <a:p>
+            <a:r>
+              <a:rPr lang="en-US" dirty="0">
+                <a:latin typeface="Arial" panose="020B0604020202020204" pitchFamily="34" charset="0"/>
+                <a:cs typeface="Arial" panose="020B0604020202020204" pitchFamily="34" charset="0"/>
+              </a:rPr>
+              <a:t>Rather than locking, perform the calculation and then see if anything has changed.</a:t>
+            </a:r>
+          </a:p>
+          <a:p>
+            <a:r>
+              <a:rPr lang="en-US" dirty="0">
+                <a:latin typeface="Arial" panose="020B0604020202020204" pitchFamily="34" charset="0"/>
+                <a:cs typeface="Arial" panose="020B0604020202020204" pitchFamily="34" charset="0"/>
+              </a:rPr>
+              <a:t>If it’s changed, you can try again (or not…)</a:t>
+            </a:r>
+          </a:p>
+          <a:p>
+            <a:endParaRPr lang="en-US" dirty="0">
+              <a:latin typeface="Arial" panose="020B0604020202020204" pitchFamily="34" charset="0"/>
+              <a:cs typeface="Arial" panose="020B0604020202020204" pitchFamily="34" charset="0"/>
+            </a:endParaRPr>
+          </a:p>
+          <a:p>
+            <a:r>
+              <a:rPr lang="en-US" dirty="0">
+                <a:latin typeface="Arial" panose="020B0604020202020204" pitchFamily="34" charset="0"/>
+                <a:cs typeface="Arial" panose="020B0604020202020204" pitchFamily="34" charset="0"/>
+              </a:rPr>
+              <a:t>It is better to “beg forgiveness than ask permission”</a:t>
+            </a:r>
+          </a:p>
+          <a:p>
+            <a:endParaRPr lang="en-US" dirty="0">
+              <a:latin typeface="Arial" panose="020B0604020202020204" pitchFamily="34" charset="0"/>
+              <a:cs typeface="Arial" panose="020B0604020202020204" pitchFamily="34" charset="0"/>
+            </a:endParaRPr>
+          </a:p>
+          <a:p>
+            <a:r>
+              <a:rPr lang="en-US" dirty="0">
+                <a:latin typeface="Arial" panose="020B0604020202020204" pitchFamily="34" charset="0"/>
+                <a:cs typeface="Arial" panose="020B0604020202020204" pitchFamily="34" charset="0"/>
+              </a:rPr>
+              <a:t>Compare and Swap is implemented at the hardware level meaning it can be very fast…</a:t>
+            </a:r>
+          </a:p>
+          <a:p>
+            <a:r>
+              <a:rPr lang="en-US" dirty="0">
+                <a:latin typeface="Arial" panose="020B0604020202020204" pitchFamily="34" charset="0"/>
+                <a:cs typeface="Arial" panose="020B0604020202020204" pitchFamily="34" charset="0"/>
+              </a:rPr>
+              <a:t>Avoids explicit synchronization…</a:t>
+            </a:r>
+          </a:p>
+          <a:p>
+            <a:endParaRPr lang="en-US" dirty="0">
+              <a:latin typeface="Arial" panose="020B0604020202020204" pitchFamily="34" charset="0"/>
+              <a:cs typeface="Arial" panose="020B0604020202020204" pitchFamily="34" charset="0"/>
+            </a:endParaRPr>
+          </a:p>
+          <a:p>
+            <a:endParaRPr lang="en-US" dirty="0">
+              <a:latin typeface="Arial" panose="020B0604020202020204" pitchFamily="34" charset="0"/>
+              <a:cs typeface="Arial" panose="020B0604020202020204" pitchFamily="34" charset="0"/>
+            </a:endParaRPr>
+          </a:p>
+        </p:txBody>
+      </p:sp>
       <p:pic>
         <p:nvPicPr>
-          <p:cNvPr id="4" name="Picture 3"/>
+          <p:cNvPr id="5" name="Picture 4"/>
           <p:cNvPicPr>
             <a:picLocks noChangeAspect="1"/>
           </p:cNvPicPr>
@@ -4919,124 +5445,18 @@
         </p:blipFill>
         <p:spPr>
           <a:xfrm>
-            <a:off x="2025608" y="1302945"/>
-            <a:ext cx="5586474" cy="4298885"/>
+            <a:off x="2297254" y="2658875"/>
+            <a:ext cx="7067923" cy="4199125"/>
           </a:xfrm>
           <a:prstGeom prst="rect">
             <a:avLst/>
           </a:prstGeom>
         </p:spPr>
       </p:pic>
-      <p:sp>
-        <p:nvSpPr>
-          <p:cNvPr id="5" name="TextBox 4"/>
-          <p:cNvSpPr txBox="1"/>
-          <p:nvPr/>
-        </p:nvSpPr>
-        <p:spPr>
-          <a:xfrm>
-            <a:off x="1282535" y="463138"/>
-            <a:ext cx="6019661" cy="369332"/>
-          </a:xfrm>
-          <a:prstGeom prst="rect">
-            <a:avLst/>
-          </a:prstGeom>
-          <a:noFill/>
-        </p:spPr>
-        <p:txBody>
-          <a:bodyPr wrap="none" rtlCol="0">
-            <a:spAutoFit/>
-          </a:bodyPr>
-          <a:lstStyle/>
-          <a:p>
-            <a:r>
-              <a:rPr lang="en-US" dirty="0">
-                <a:latin typeface="Arial" panose="020B0604020202020204" pitchFamily="34" charset="0"/>
-                <a:cs typeface="Arial" panose="020B0604020202020204" pitchFamily="34" charset="0"/>
-              </a:rPr>
-              <a:t>Here is a simulated atomic </a:t>
-            </a:r>
-            <a:r>
-              <a:rPr lang="en-US" dirty="0" err="1">
-                <a:latin typeface="Arial" panose="020B0604020202020204" pitchFamily="34" charset="0"/>
-                <a:cs typeface="Arial" panose="020B0604020202020204" pitchFamily="34" charset="0"/>
-              </a:rPr>
-              <a:t>incrementer</a:t>
-            </a:r>
-            <a:r>
-              <a:rPr lang="en-US" dirty="0">
-                <a:latin typeface="Arial" panose="020B0604020202020204" pitchFamily="34" charset="0"/>
-                <a:cs typeface="Arial" panose="020B0604020202020204" pitchFamily="34" charset="0"/>
-              </a:rPr>
-              <a:t> (like </a:t>
-            </a:r>
-            <a:r>
-              <a:rPr lang="en-US" dirty="0" err="1">
-                <a:latin typeface="Arial" panose="020B0604020202020204" pitchFamily="34" charset="0"/>
-                <a:cs typeface="Arial" panose="020B0604020202020204" pitchFamily="34" charset="0"/>
-              </a:rPr>
-              <a:t>AtomicLong</a:t>
-            </a:r>
-            <a:r>
-              <a:rPr lang="en-US" dirty="0">
-                <a:latin typeface="Arial" panose="020B0604020202020204" pitchFamily="34" charset="0"/>
-                <a:cs typeface="Arial" panose="020B0604020202020204" pitchFamily="34" charset="0"/>
-              </a:rPr>
-              <a:t>)</a:t>
-            </a:r>
-          </a:p>
-        </p:txBody>
-      </p:sp>
-      <p:sp>
-        <p:nvSpPr>
-          <p:cNvPr id="7" name="TextBox 6"/>
-          <p:cNvSpPr txBox="1"/>
-          <p:nvPr/>
-        </p:nvSpPr>
-        <p:spPr>
-          <a:xfrm>
-            <a:off x="829294" y="5887639"/>
-            <a:ext cx="11174854" cy="369332"/>
-          </a:xfrm>
-          <a:prstGeom prst="rect">
-            <a:avLst/>
-          </a:prstGeom>
-          <a:noFill/>
-        </p:spPr>
-        <p:txBody>
-          <a:bodyPr wrap="none" rtlCol="0">
-            <a:spAutoFit/>
-          </a:bodyPr>
-          <a:lstStyle/>
-          <a:p>
-            <a:r>
-              <a:rPr lang="en-US" dirty="0">
-                <a:latin typeface="Arial" panose="020B0604020202020204" pitchFamily="34" charset="0"/>
-                <a:cs typeface="Arial" panose="020B0604020202020204" pitchFamily="34" charset="0"/>
-              </a:rPr>
-              <a:t>Because </a:t>
-            </a:r>
-            <a:r>
-              <a:rPr lang="en-US" dirty="0" err="1">
-                <a:latin typeface="Arial" panose="020B0604020202020204" pitchFamily="34" charset="0"/>
-                <a:cs typeface="Arial" panose="020B0604020202020204" pitchFamily="34" charset="0"/>
-              </a:rPr>
-              <a:t>compareAndSwap</a:t>
-            </a:r>
-            <a:r>
-              <a:rPr lang="en-US" dirty="0">
-                <a:latin typeface="Arial" panose="020B0604020202020204" pitchFamily="34" charset="0"/>
-                <a:cs typeface="Arial" panose="020B0604020202020204" pitchFamily="34" charset="0"/>
-              </a:rPr>
-              <a:t> can be implemented in hardware, this can be very fast and minimize contention</a:t>
-            </a:r>
-          </a:p>
-        </p:txBody>
-      </p:sp>
     </p:spTree>
     <p:extLst>
       <p:ext uri="{BB962C8B-B14F-4D97-AF65-F5344CB8AC3E}">
-        <p14:creationId xmlns:p14="http://schemas.microsoft.com/office/powerpoint/2010/main" val="700089392"/>
+        <p14:creationId xmlns:p14="http://schemas.microsoft.com/office/powerpoint/2010/main" val="4038035447"/>
       </p:ext>
     </p:extLst>
   </p:cSld>
@@ -5063,9 +5483,50 @@
           <a:chExt cx="0" cy="0"/>
         </a:xfrm>
       </p:grpSpPr>
+      <p:sp>
+        <p:nvSpPr>
+          <p:cNvPr id="4" name="TextBox 3"/>
+          <p:cNvSpPr txBox="1"/>
+          <p:nvPr/>
+        </p:nvSpPr>
+        <p:spPr>
+          <a:xfrm>
+            <a:off x="1306286" y="142504"/>
+            <a:ext cx="9494907" cy="646331"/>
+          </a:xfrm>
+          <a:prstGeom prst="rect">
+            <a:avLst/>
+          </a:prstGeom>
+          <a:noFill/>
+        </p:spPr>
+        <p:txBody>
+          <a:bodyPr wrap="none" rtlCol="0">
+            <a:spAutoFit/>
+          </a:bodyPr>
+          <a:lstStyle/>
+          <a:p>
+            <a:r>
+              <a:rPr lang="en-US" dirty="0">
+                <a:latin typeface="Arial" panose="020B0604020202020204" pitchFamily="34" charset="0"/>
+                <a:cs typeface="Arial" panose="020B0604020202020204" pitchFamily="34" charset="0"/>
+              </a:rPr>
+              <a:t>This is what compare and swap does (but not how it really works since the CPU can do this</a:t>
+            </a:r>
+          </a:p>
+          <a:p>
+            <a:r>
+              <a:rPr lang="en-US" dirty="0">
+                <a:latin typeface="Arial" panose="020B0604020202020204" pitchFamily="34" charset="0"/>
+                <a:cs typeface="Arial" panose="020B0604020202020204" pitchFamily="34" charset="0"/>
+              </a:rPr>
+              <a:t>without explicit synchronization)</a:t>
+            </a:r>
+          </a:p>
+        </p:txBody>
+      </p:sp>
       <p:pic>
         <p:nvPicPr>
-          <p:cNvPr id="4" name="Picture 3"/>
+          <p:cNvPr id="5" name="Picture 4"/>
           <p:cNvPicPr>
             <a:picLocks noChangeAspect="1"/>
           </p:cNvPicPr>
@@ -5079,208 +5540,18 @@
         </p:blipFill>
         <p:spPr>
           <a:xfrm>
-            <a:off x="1931347" y="699903"/>
-            <a:ext cx="6550045" cy="5748398"/>
+            <a:off x="2320760" y="922812"/>
+            <a:ext cx="7126532" cy="4456710"/>
           </a:xfrm>
           <a:prstGeom prst="rect">
             <a:avLst/>
           </a:prstGeom>
         </p:spPr>
       </p:pic>
-      <p:sp>
-        <p:nvSpPr>
-          <p:cNvPr id="5" name="TextBox 4"/>
-          <p:cNvSpPr txBox="1"/>
-          <p:nvPr/>
-        </p:nvSpPr>
-        <p:spPr>
-          <a:xfrm>
-            <a:off x="617517" y="213756"/>
-            <a:ext cx="5609292" cy="369332"/>
-          </a:xfrm>
-          <a:prstGeom prst="rect">
-            <a:avLst/>
-          </a:prstGeom>
-          <a:noFill/>
-        </p:spPr>
-        <p:txBody>
-          <a:bodyPr wrap="none" rtlCol="0">
-            <a:spAutoFit/>
-          </a:bodyPr>
-          <a:lstStyle/>
-          <a:p>
-            <a:r>
-              <a:rPr lang="en-US" dirty="0">
-                <a:latin typeface="Arial" panose="020B0604020202020204" pitchFamily="34" charset="0"/>
-                <a:cs typeface="Arial" panose="020B0604020202020204" pitchFamily="34" charset="0"/>
-              </a:rPr>
-              <a:t>A compare and swap version of a </a:t>
-            </a:r>
-            <a:r>
-              <a:rPr lang="en-US" dirty="0" err="1">
-                <a:latin typeface="Arial" panose="020B0604020202020204" pitchFamily="34" charset="0"/>
-                <a:cs typeface="Arial" panose="020B0604020202020204" pitchFamily="34" charset="0"/>
-              </a:rPr>
-              <a:t>NumberRange</a:t>
-            </a:r>
-            <a:r>
-              <a:rPr lang="en-US" dirty="0">
-                <a:latin typeface="Arial" panose="020B0604020202020204" pitchFamily="34" charset="0"/>
-                <a:cs typeface="Arial" panose="020B0604020202020204" pitchFamily="34" charset="0"/>
-              </a:rPr>
-              <a:t> pair</a:t>
-            </a:r>
-          </a:p>
-        </p:txBody>
-      </p:sp>
-      <p:cxnSp>
-        <p:nvCxnSpPr>
-          <p:cNvPr id="7" name="Straight Arrow Connector 6"/>
-          <p:cNvCxnSpPr/>
-          <p:nvPr/>
-        </p:nvCxnSpPr>
-        <p:spPr>
-          <a:xfrm flipH="1">
-            <a:off x="5961413" y="4393870"/>
-            <a:ext cx="961901" cy="213756"/>
-          </a:xfrm>
-          <a:prstGeom prst="straightConnector1">
-            <a:avLst/>
-          </a:prstGeom>
-          <a:ln>
-            <a:tailEnd type="triangle"/>
-          </a:ln>
-        </p:spPr>
-        <p:style>
-          <a:lnRef idx="1">
-            <a:schemeClr val="accent1"/>
-          </a:lnRef>
-          <a:fillRef idx="0">
-            <a:schemeClr val="accent1"/>
-          </a:fillRef>
-          <a:effectRef idx="0">
-            <a:schemeClr val="accent1"/>
-          </a:effectRef>
-          <a:fontRef idx="minor">
-            <a:schemeClr val="tx1"/>
-          </a:fontRef>
-        </p:style>
-      </p:cxnSp>
-      <p:sp>
-        <p:nvSpPr>
-          <p:cNvPr id="8" name="TextBox 7"/>
-          <p:cNvSpPr txBox="1"/>
-          <p:nvPr/>
-        </p:nvSpPr>
-        <p:spPr>
-          <a:xfrm>
-            <a:off x="7053945" y="4085113"/>
-            <a:ext cx="4172937" cy="646331"/>
-          </a:xfrm>
-          <a:prstGeom prst="rect">
-            <a:avLst/>
-          </a:prstGeom>
-          <a:noFill/>
-        </p:spPr>
-        <p:txBody>
-          <a:bodyPr wrap="none" rtlCol="0">
-            <a:spAutoFit/>
-          </a:bodyPr>
-          <a:lstStyle/>
-          <a:p>
-            <a:r>
-              <a:rPr lang="en-US" dirty="0">
-                <a:latin typeface="Arial" panose="020B0604020202020204" pitchFamily="34" charset="0"/>
-                <a:cs typeface="Arial" panose="020B0604020202020204" pitchFamily="34" charset="0"/>
-              </a:rPr>
-              <a:t>Have to be careful can’t be out of order</a:t>
-            </a:r>
-          </a:p>
-          <a:p>
-            <a:r>
-              <a:rPr lang="en-US" dirty="0">
-                <a:latin typeface="Arial" panose="020B0604020202020204" pitchFamily="34" charset="0"/>
-                <a:cs typeface="Arial" panose="020B0604020202020204" pitchFamily="34" charset="0"/>
-              </a:rPr>
-              <a:t>in either the old or the new…</a:t>
-            </a:r>
-          </a:p>
-        </p:txBody>
-      </p:sp>
-      <p:cxnSp>
-        <p:nvCxnSpPr>
-          <p:cNvPr id="10" name="Straight Arrow Connector 9"/>
-          <p:cNvCxnSpPr/>
-          <p:nvPr/>
-        </p:nvCxnSpPr>
-        <p:spPr>
-          <a:xfrm flipH="1" flipV="1">
-            <a:off x="5260769" y="5510151"/>
-            <a:ext cx="1365662" cy="510639"/>
-          </a:xfrm>
-          <a:prstGeom prst="straightConnector1">
-            <a:avLst/>
-          </a:prstGeom>
-          <a:ln>
-            <a:tailEnd type="triangle"/>
-          </a:ln>
-        </p:spPr>
-        <p:style>
-          <a:lnRef idx="1">
-            <a:schemeClr val="accent1"/>
-          </a:lnRef>
-          <a:fillRef idx="0">
-            <a:schemeClr val="accent1"/>
-          </a:fillRef>
-          <a:effectRef idx="0">
-            <a:schemeClr val="accent1"/>
-          </a:effectRef>
-          <a:fontRef idx="minor">
-            <a:schemeClr val="tx1"/>
-          </a:fontRef>
-        </p:style>
-      </p:cxnSp>
-      <p:sp>
-        <p:nvSpPr>
-          <p:cNvPr id="11" name="TextBox 10"/>
-          <p:cNvSpPr txBox="1"/>
-          <p:nvPr/>
-        </p:nvSpPr>
-        <p:spPr>
-          <a:xfrm>
-            <a:off x="6768935" y="5949539"/>
-            <a:ext cx="3835537" cy="369332"/>
-          </a:xfrm>
-          <a:prstGeom prst="rect">
-            <a:avLst/>
-          </a:prstGeom>
-          <a:noFill/>
-        </p:spPr>
-        <p:txBody>
-          <a:bodyPr wrap="none" rtlCol="0">
-            <a:spAutoFit/>
-          </a:bodyPr>
-          <a:lstStyle/>
-          <a:p>
-            <a:r>
-              <a:rPr lang="en-US" dirty="0"/>
-              <a:t>Returns true if the </a:t>
-            </a:r>
-            <a:r>
-              <a:rPr lang="en-US" dirty="0" err="1"/>
-              <a:t>oldv</a:t>
-            </a:r>
-            <a:r>
-              <a:rPr lang="en-US" dirty="0"/>
-              <a:t> hasn’t changed</a:t>
-            </a:r>
-          </a:p>
-        </p:txBody>
-      </p:sp>
     </p:spTree>
     <p:extLst>
       <p:ext uri="{BB962C8B-B14F-4D97-AF65-F5344CB8AC3E}">
-        <p14:creationId xmlns:p14="http://schemas.microsoft.com/office/powerpoint/2010/main" val="52205673"/>
+        <p14:creationId xmlns:p14="http://schemas.microsoft.com/office/powerpoint/2010/main" val="3549752082"/>
       </p:ext>
     </p:extLst>
   </p:cSld>
@@ -5323,8 +5594,8 @@
         </p:blipFill>
         <p:spPr>
           <a:xfrm>
-            <a:off x="1543607" y="1626734"/>
-            <a:ext cx="8027897" cy="3919043"/>
+            <a:off x="2025608" y="1302945"/>
+            <a:ext cx="5586474" cy="4298885"/>
           </a:xfrm>
           <a:prstGeom prst="rect">
             <a:avLst/>
@@ -5339,8 +5610,8 @@
         </p:nvSpPr>
         <p:spPr>
           <a:xfrm>
-            <a:off x="2565070" y="273132"/>
-            <a:ext cx="8263801" cy="646331"/>
+            <a:off x="1282535" y="463138"/>
+            <a:ext cx="6019661" cy="369332"/>
           </a:xfrm>
           <a:prstGeom prst="rect">
             <a:avLst/>
@@ -5358,63 +5629,49 @@
                 <a:latin typeface="Arial" panose="020B0604020202020204" pitchFamily="34" charset="0"/>
                 <a:cs typeface="Arial" panose="020B0604020202020204" pitchFamily="34" charset="0"/>
               </a:rPr>
-              <a:t>Under high contention, it doesn’t help that much to use a compare and swap….</a:t>
-            </a:r>
-          </a:p>
-          <a:p>
+              <a:t>Here is a simulated atomic </a:t>
+            </a:r>
+            <a:r>
+              <a:rPr lang="en-US" dirty="0" err="1">
+                <a:latin typeface="Arial" panose="020B0604020202020204" pitchFamily="34" charset="0"/>
+                <a:cs typeface="Arial" panose="020B0604020202020204" pitchFamily="34" charset="0"/>
+              </a:rPr>
+              <a:t>incrementer</a:t>
+            </a:r>
             <a:r>
               <a:rPr lang="en-US" dirty="0">
                 <a:latin typeface="Arial" panose="020B0604020202020204" pitchFamily="34" charset="0"/>
                 <a:cs typeface="Arial" panose="020B0604020202020204" pitchFamily="34" charset="0"/>
               </a:rPr>
-              <a:t>(can’t avoid the contention)</a:t>
-            </a:r>
-          </a:p>
-        </p:txBody>
-      </p:sp>
-      <p:cxnSp>
-        <p:nvCxnSpPr>
-          <p:cNvPr id="7" name="Straight Arrow Connector 6"/>
-          <p:cNvCxnSpPr/>
-          <p:nvPr/>
-        </p:nvCxnSpPr>
-        <p:spPr>
-          <a:xfrm flipH="1">
-            <a:off x="8217725" y="2956956"/>
-            <a:ext cx="593766" cy="427512"/>
-          </a:xfrm>
-          <a:prstGeom prst="straightConnector1">
-            <a:avLst/>
-          </a:prstGeom>
-          <a:ln>
-            <a:tailEnd type="triangle"/>
-          </a:ln>
-        </p:spPr>
-        <p:style>
-          <a:lnRef idx="1">
-            <a:schemeClr val="accent1"/>
-          </a:lnRef>
-          <a:fillRef idx="0">
-            <a:schemeClr val="accent1"/>
-          </a:fillRef>
-          <a:effectRef idx="0">
-            <a:schemeClr val="accent1"/>
-          </a:effectRef>
-          <a:fontRef idx="minor">
-            <a:schemeClr val="tx1"/>
-          </a:fontRef>
-        </p:style>
-      </p:cxnSp>
-      <p:sp>
-        <p:nvSpPr>
-          <p:cNvPr id="8" name="TextBox 7"/>
+              <a:t> (like </a:t>
+            </a:r>
+            <a:r>
+              <a:rPr lang="en-US" dirty="0" err="1">
+                <a:latin typeface="Arial" panose="020B0604020202020204" pitchFamily="34" charset="0"/>
+                <a:cs typeface="Arial" panose="020B0604020202020204" pitchFamily="34" charset="0"/>
+              </a:rPr>
+              <a:t>AtomicLong</a:t>
+            </a:r>
+            <a:r>
+              <a:rPr lang="en-US" dirty="0">
+                <a:latin typeface="Arial" panose="020B0604020202020204" pitchFamily="34" charset="0"/>
+                <a:cs typeface="Arial" panose="020B0604020202020204" pitchFamily="34" charset="0"/>
+              </a:rPr>
+              <a:t>)</a:t>
+            </a:r>
+          </a:p>
+        </p:txBody>
+      </p:sp>
+      <p:sp>
+        <p:nvSpPr>
+          <p:cNvPr id="7" name="TextBox 6"/>
           <p:cNvSpPr txBox="1"/>
           <p:nvPr/>
         </p:nvSpPr>
         <p:spPr>
           <a:xfrm>
-            <a:off x="8847117" y="2766952"/>
-            <a:ext cx="3082895" cy="369332"/>
+            <a:off x="829294" y="5887639"/>
+            <a:ext cx="11174854" cy="369332"/>
           </a:xfrm>
           <a:prstGeom prst="rect">
             <a:avLst/>
@@ -5432,81 +5689,21 @@
                 <a:latin typeface="Arial" panose="020B0604020202020204" pitchFamily="34" charset="0"/>
                 <a:cs typeface="Arial" panose="020B0604020202020204" pitchFamily="34" charset="0"/>
               </a:rPr>
-              <a:t>No contention ( as a control)</a:t>
-            </a:r>
-          </a:p>
-        </p:txBody>
-      </p:sp>
-      <p:cxnSp>
-        <p:nvCxnSpPr>
-          <p:cNvPr id="10" name="Straight Arrow Connector 9"/>
-          <p:cNvCxnSpPr/>
-          <p:nvPr/>
-        </p:nvCxnSpPr>
-        <p:spPr>
-          <a:xfrm flipH="1" flipV="1">
-            <a:off x="8217725" y="4999512"/>
-            <a:ext cx="629392" cy="902524"/>
-          </a:xfrm>
-          <a:prstGeom prst="straightConnector1">
-            <a:avLst/>
-          </a:prstGeom>
-          <a:ln>
-            <a:tailEnd type="triangle"/>
-          </a:ln>
-        </p:spPr>
-        <p:style>
-          <a:lnRef idx="1">
-            <a:schemeClr val="accent1"/>
-          </a:lnRef>
-          <a:fillRef idx="0">
-            <a:schemeClr val="accent1"/>
-          </a:fillRef>
-          <a:effectRef idx="0">
-            <a:schemeClr val="accent1"/>
-          </a:effectRef>
-          <a:fontRef idx="minor">
-            <a:schemeClr val="tx1"/>
-          </a:fontRef>
-        </p:style>
-      </p:cxnSp>
-      <p:sp>
-        <p:nvSpPr>
-          <p:cNvPr id="11" name="TextBox 10"/>
-          <p:cNvSpPr txBox="1"/>
-          <p:nvPr/>
-        </p:nvSpPr>
-        <p:spPr>
-          <a:xfrm>
-            <a:off x="7338951" y="5913915"/>
-            <a:ext cx="4160113" cy="646331"/>
-          </a:xfrm>
-          <a:prstGeom prst="rect">
-            <a:avLst/>
-          </a:prstGeom>
-          <a:noFill/>
-        </p:spPr>
-        <p:txBody>
-          <a:bodyPr wrap="none" rtlCol="0">
-            <a:spAutoFit/>
-          </a:bodyPr>
-          <a:lstStyle/>
-          <a:p>
+              <a:t>Because </a:t>
+            </a:r>
+            <a:r>
+              <a:rPr lang="en-US" dirty="0" err="1">
+                <a:latin typeface="Arial" panose="020B0604020202020204" pitchFamily="34" charset="0"/>
+                <a:cs typeface="Arial" panose="020B0604020202020204" pitchFamily="34" charset="0"/>
+              </a:rPr>
+              <a:t>compareAndSwap</a:t>
+            </a:r>
             <a:r>
               <a:rPr lang="en-US" dirty="0">
                 <a:latin typeface="Arial" panose="020B0604020202020204" pitchFamily="34" charset="0"/>
                 <a:cs typeface="Arial" panose="020B0604020202020204" pitchFamily="34" charset="0"/>
               </a:rPr>
-              <a:t>Asking for permission and </a:t>
-            </a:r>
-          </a:p>
-          <a:p>
-            <a:r>
-              <a:rPr lang="en-US" dirty="0">
-                <a:latin typeface="Arial" panose="020B0604020202020204" pitchFamily="34" charset="0"/>
-                <a:cs typeface="Arial" panose="020B0604020202020204" pitchFamily="34" charset="0"/>
-              </a:rPr>
-              <a:t>Begging forgiveness is about the same</a:t>
+              <a:t> can be implemented in hardware, this can be very fast and minimize contention</a:t>
             </a:r>
           </a:p>
         </p:txBody>
@@ -5514,7 +5711,7 @@
     </p:spTree>
     <p:extLst>
       <p:ext uri="{BB962C8B-B14F-4D97-AF65-F5344CB8AC3E}">
-        <p14:creationId xmlns:p14="http://schemas.microsoft.com/office/powerpoint/2010/main" val="2021534935"/>
+        <p14:creationId xmlns:p14="http://schemas.microsoft.com/office/powerpoint/2010/main" val="700089392"/>
       </p:ext>
     </p:extLst>
   </p:cSld>
@@ -5557,48 +5754,24 @@
         </p:blipFill>
         <p:spPr>
           <a:xfrm>
-            <a:off x="2488870" y="338446"/>
-            <a:ext cx="6858000" cy="457200"/>
+            <a:off x="1931347" y="699903"/>
+            <a:ext cx="6550045" cy="5748398"/>
           </a:xfrm>
           <a:prstGeom prst="rect">
             <a:avLst/>
           </a:prstGeom>
         </p:spPr>
       </p:pic>
-      <p:pic>
-        <p:nvPicPr>
-          <p:cNvPr id="5" name="Picture 4"/>
-          <p:cNvPicPr>
-            <a:picLocks noChangeAspect="1"/>
-          </p:cNvPicPr>
-          <p:nvPr/>
-        </p:nvPicPr>
-        <p:blipFill>
-          <a:blip r:embed="rId3"/>
-          <a:stretch>
-            <a:fillRect/>
-          </a:stretch>
-        </p:blipFill>
-        <p:spPr>
-          <a:xfrm>
-            <a:off x="2688895" y="997526"/>
-            <a:ext cx="6457950" cy="2981325"/>
-          </a:xfrm>
-          <a:prstGeom prst="rect">
-            <a:avLst/>
-          </a:prstGeom>
-        </p:spPr>
-      </p:pic>
-      <p:sp>
-        <p:nvSpPr>
-          <p:cNvPr id="6" name="TextBox 5"/>
+      <p:sp>
+        <p:nvSpPr>
+          <p:cNvPr id="5" name="TextBox 4"/>
           <p:cNvSpPr txBox="1"/>
           <p:nvPr/>
         </p:nvSpPr>
         <p:spPr>
           <a:xfrm>
-            <a:off x="1508166" y="3978851"/>
-            <a:ext cx="8558753" cy="646331"/>
+            <a:off x="617517" y="213756"/>
+            <a:ext cx="5609292" cy="369332"/>
           </a:xfrm>
           <a:prstGeom prst="rect">
             <a:avLst/>
@@ -5616,16 +5789,165 @@
                 <a:latin typeface="Arial" panose="020B0604020202020204" pitchFamily="34" charset="0"/>
                 <a:cs typeface="Arial" panose="020B0604020202020204" pitchFamily="34" charset="0"/>
               </a:rPr>
-              <a:t>Here begging forgiveness is a better strategy.</a:t>
-            </a:r>
-          </a:p>
-          <a:p>
+              <a:t>A compare and swap version of a </a:t>
+            </a:r>
+            <a:r>
+              <a:rPr lang="en-US" dirty="0" err="1">
+                <a:latin typeface="Arial" panose="020B0604020202020204" pitchFamily="34" charset="0"/>
+                <a:cs typeface="Arial" panose="020B0604020202020204" pitchFamily="34" charset="0"/>
+              </a:rPr>
+              <a:t>NumberRange</a:t>
+            </a:r>
             <a:r>
               <a:rPr lang="en-US" dirty="0">
                 <a:latin typeface="Arial" panose="020B0604020202020204" pitchFamily="34" charset="0"/>
                 <a:cs typeface="Arial" panose="020B0604020202020204" pitchFamily="34" charset="0"/>
               </a:rPr>
-              <a:t>Our optimism that another thread hasn’t messed up our results is more rewarded..</a:t>
+              <a:t> pair</a:t>
+            </a:r>
+          </a:p>
+        </p:txBody>
+      </p:sp>
+      <p:cxnSp>
+        <p:nvCxnSpPr>
+          <p:cNvPr id="7" name="Straight Arrow Connector 6"/>
+          <p:cNvCxnSpPr/>
+          <p:nvPr/>
+        </p:nvCxnSpPr>
+        <p:spPr>
+          <a:xfrm flipH="1">
+            <a:off x="5961413" y="4393870"/>
+            <a:ext cx="961901" cy="213756"/>
+          </a:xfrm>
+          <a:prstGeom prst="straightConnector1">
+            <a:avLst/>
+          </a:prstGeom>
+          <a:ln>
+            <a:tailEnd type="triangle"/>
+          </a:ln>
+        </p:spPr>
+        <p:style>
+          <a:lnRef idx="1">
+            <a:schemeClr val="accent1"/>
+          </a:lnRef>
+          <a:fillRef idx="0">
+            <a:schemeClr val="accent1"/>
+          </a:fillRef>
+          <a:effectRef idx="0">
+            <a:schemeClr val="accent1"/>
+          </a:effectRef>
+          <a:fontRef idx="minor">
+            <a:schemeClr val="tx1"/>
+          </a:fontRef>
+        </p:style>
+      </p:cxnSp>
+      <p:sp>
+        <p:nvSpPr>
+          <p:cNvPr id="8" name="TextBox 7"/>
+          <p:cNvSpPr txBox="1"/>
+          <p:nvPr/>
+        </p:nvSpPr>
+        <p:spPr>
+          <a:xfrm>
+            <a:off x="7053945" y="4085113"/>
+            <a:ext cx="4172937" cy="646331"/>
+          </a:xfrm>
+          <a:prstGeom prst="rect">
+            <a:avLst/>
+          </a:prstGeom>
+          <a:noFill/>
+        </p:spPr>
+        <p:txBody>
+          <a:bodyPr wrap="none" rtlCol="0">
+            <a:spAutoFit/>
+          </a:bodyPr>
+          <a:lstStyle/>
+          <a:p>
+            <a:r>
+              <a:rPr lang="en-US" dirty="0">
+                <a:latin typeface="Arial" panose="020B0604020202020204" pitchFamily="34" charset="0"/>
+                <a:cs typeface="Arial" panose="020B0604020202020204" pitchFamily="34" charset="0"/>
+              </a:rPr>
+              <a:t>Have to be careful can’t be out of order</a:t>
+            </a:r>
+          </a:p>
+          <a:p>
+            <a:r>
+              <a:rPr lang="en-US" dirty="0">
+                <a:latin typeface="Arial" panose="020B0604020202020204" pitchFamily="34" charset="0"/>
+                <a:cs typeface="Arial" panose="020B0604020202020204" pitchFamily="34" charset="0"/>
+              </a:rPr>
+              <a:t>in either the old or the new…</a:t>
+            </a:r>
+          </a:p>
+        </p:txBody>
+      </p:sp>
+      <p:cxnSp>
+        <p:nvCxnSpPr>
+          <p:cNvPr id="10" name="Straight Arrow Connector 9"/>
+          <p:cNvCxnSpPr/>
+          <p:nvPr/>
+        </p:nvCxnSpPr>
+        <p:spPr>
+          <a:xfrm flipH="1" flipV="1">
+            <a:off x="5260769" y="5510151"/>
+            <a:ext cx="1365662" cy="510639"/>
+          </a:xfrm>
+          <a:prstGeom prst="straightConnector1">
+            <a:avLst/>
+          </a:prstGeom>
+          <a:ln>
+            <a:tailEnd type="triangle"/>
+          </a:ln>
+        </p:spPr>
+        <p:style>
+          <a:lnRef idx="1">
+            <a:schemeClr val="accent1"/>
+          </a:lnRef>
+          <a:fillRef idx="0">
+            <a:schemeClr val="accent1"/>
+          </a:fillRef>
+          <a:effectRef idx="0">
+            <a:schemeClr val="accent1"/>
+          </a:effectRef>
+          <a:fontRef idx="minor">
+            <a:schemeClr val="tx1"/>
+          </a:fontRef>
+        </p:style>
+      </p:cxnSp>
+      <p:sp>
+        <p:nvSpPr>
+          <p:cNvPr id="11" name="TextBox 10"/>
+          <p:cNvSpPr txBox="1"/>
+          <p:nvPr/>
+        </p:nvSpPr>
+        <p:spPr>
+          <a:xfrm>
+            <a:off x="6768935" y="5949539"/>
+            <a:ext cx="3835537" cy="369332"/>
+          </a:xfrm>
+          <a:prstGeom prst="rect">
+            <a:avLst/>
+          </a:prstGeom>
+          <a:noFill/>
+        </p:spPr>
+        <p:txBody>
+          <a:bodyPr wrap="none" rtlCol="0">
+            <a:spAutoFit/>
+          </a:bodyPr>
+          <a:lstStyle/>
+          <a:p>
+            <a:r>
+              <a:rPr lang="en-US" dirty="0"/>
+              <a:t>Returns true if the </a:t>
+            </a:r>
+            <a:r>
+              <a:rPr lang="en-US" dirty="0" err="1"/>
+              <a:t>oldv</a:t>
+            </a:r>
+            <a:r>
+              <a:rPr lang="en-US" dirty="0"/>
+              <a:t> hasn’t changed</a:t>
             </a:r>
           </a:p>
         </p:txBody>
@@ -5633,7 +5955,7 @@
     </p:spTree>
     <p:extLst>
       <p:ext uri="{BB962C8B-B14F-4D97-AF65-F5344CB8AC3E}">
-        <p14:creationId xmlns:p14="http://schemas.microsoft.com/office/powerpoint/2010/main" val="1266999771"/>
+        <p14:creationId xmlns:p14="http://schemas.microsoft.com/office/powerpoint/2010/main" val="52205673"/>
       </p:ext>
     </p:extLst>
   </p:cSld>
@@ -5746,77 +6068,40 @@
           <a:chExt cx="0" cy="0"/>
         </a:xfrm>
       </p:grpSpPr>
-      <p:sp>
-        <p:nvSpPr>
-          <p:cNvPr id="4" name="TextBox 3"/>
-          <p:cNvSpPr txBox="1"/>
-          <p:nvPr/>
-        </p:nvSpPr>
-        <p:spPr>
-          <a:xfrm>
-            <a:off x="2590800" y="1419225"/>
-            <a:ext cx="3908506" cy="369332"/>
-          </a:xfrm>
-          <a:prstGeom prst="rect">
-            <a:avLst/>
-          </a:prstGeom>
-          <a:noFill/>
-        </p:spPr>
-        <p:txBody>
-          <a:bodyPr wrap="none" rtlCol="0">
-            <a:spAutoFit/>
-          </a:bodyPr>
-          <a:lstStyle/>
-          <a:p>
-            <a:r>
-              <a:rPr lang="en-US" dirty="0"/>
-              <a:t>There is, of course, no documentation.  </a:t>
-            </a:r>
-          </a:p>
-        </p:txBody>
-      </p:sp>
       <p:pic>
         <p:nvPicPr>
-          <p:cNvPr id="4099" name="Picture 3"/>
+          <p:cNvPr id="4" name="Picture 3"/>
           <p:cNvPicPr>
-            <a:picLocks noChangeAspect="1" noChangeArrowheads="1"/>
+            <a:picLocks noChangeAspect="1"/>
           </p:cNvPicPr>
           <p:nvPr/>
         </p:nvPicPr>
         <p:blipFill>
-          <a:blip r:embed="rId3" cstate="print"/>
-          <a:srcRect/>
+          <a:blip r:embed="rId2"/>
           <a:stretch>
             <a:fillRect/>
           </a:stretch>
         </p:blipFill>
-        <p:spPr bwMode="auto">
-          <a:xfrm>
-            <a:off x="2590801" y="1800226"/>
-            <a:ext cx="5934075" cy="3533775"/>
-          </a:xfrm>
-          <a:prstGeom prst="rect">
-            <a:avLst/>
-          </a:prstGeom>
-          <a:noFill/>
-          <a:ln w="9525">
-            <a:noFill/>
-            <a:miter lim="800000"/>
-            <a:headEnd/>
-            <a:tailEnd/>
-          </a:ln>
+        <p:spPr>
+          <a:xfrm>
+            <a:off x="1543607" y="1626734"/>
+            <a:ext cx="8027897" cy="3919043"/>
+          </a:xfrm>
+          <a:prstGeom prst="rect">
+            <a:avLst/>
+          </a:prstGeom>
         </p:spPr>
       </p:pic>
       <p:sp>
         <p:nvSpPr>
-          <p:cNvPr id="7" name="TextBox 6"/>
+          <p:cNvPr id="5" name="TextBox 4"/>
           <p:cNvSpPr txBox="1"/>
           <p:nvPr/>
         </p:nvSpPr>
         <p:spPr>
           <a:xfrm>
-            <a:off x="1981201" y="152401"/>
-            <a:ext cx="5425524" cy="646331"/>
+            <a:off x="2565070" y="273132"/>
+            <a:ext cx="8263801" cy="646331"/>
           </a:xfrm>
           <a:prstGeom prst="rect">
             <a:avLst/>
@@ -5834,30 +6119,155 @@
                 <a:latin typeface="Arial" panose="020B0604020202020204" pitchFamily="34" charset="0"/>
                 <a:cs typeface="Arial" panose="020B0604020202020204" pitchFamily="34" charset="0"/>
               </a:rPr>
-              <a:t>We revisit here our discussion of </a:t>
-            </a:r>
-            <a:r>
-              <a:rPr lang="en-US" dirty="0" err="1">
-                <a:latin typeface="Arial" panose="020B0604020202020204" pitchFamily="34" charset="0"/>
-                <a:cs typeface="Arial" panose="020B0604020202020204" pitchFamily="34" charset="0"/>
-              </a:rPr>
-              <a:t>Random.nextInt</a:t>
-            </a:r>
+              <a:t>Under high contention, it doesn’t help that much to use a compare and swap….</a:t>
+            </a:r>
+          </a:p>
+          <a:p>
             <a:r>
               <a:rPr lang="en-US" dirty="0">
                 <a:latin typeface="Arial" panose="020B0604020202020204" pitchFamily="34" charset="0"/>
                 <a:cs typeface="Arial" panose="020B0604020202020204" pitchFamily="34" charset="0"/>
               </a:rPr>
-              <a:t>() </a:t>
-            </a:r>
-          </a:p>
+              <a:t>(can’t avoid the contention)</a:t>
+            </a:r>
+          </a:p>
+        </p:txBody>
+      </p:sp>
+      <p:cxnSp>
+        <p:nvCxnSpPr>
+          <p:cNvPr id="7" name="Straight Arrow Connector 6"/>
+          <p:cNvCxnSpPr/>
+          <p:nvPr/>
+        </p:nvCxnSpPr>
+        <p:spPr>
+          <a:xfrm flipH="1">
+            <a:off x="8217725" y="2956956"/>
+            <a:ext cx="593766" cy="427512"/>
+          </a:xfrm>
+          <a:prstGeom prst="straightConnector1">
+            <a:avLst/>
+          </a:prstGeom>
+          <a:ln>
+            <a:tailEnd type="triangle"/>
+          </a:ln>
+        </p:spPr>
+        <p:style>
+          <a:lnRef idx="1">
+            <a:schemeClr val="accent1"/>
+          </a:lnRef>
+          <a:fillRef idx="0">
+            <a:schemeClr val="accent1"/>
+          </a:fillRef>
+          <a:effectRef idx="0">
+            <a:schemeClr val="accent1"/>
+          </a:effectRef>
+          <a:fontRef idx="minor">
+            <a:schemeClr val="tx1"/>
+          </a:fontRef>
+        </p:style>
+      </p:cxnSp>
+      <p:sp>
+        <p:nvSpPr>
+          <p:cNvPr id="8" name="TextBox 7"/>
+          <p:cNvSpPr txBox="1"/>
+          <p:nvPr/>
+        </p:nvSpPr>
+        <p:spPr>
+          <a:xfrm>
+            <a:off x="8847117" y="2766952"/>
+            <a:ext cx="3082895" cy="369332"/>
+          </a:xfrm>
+          <a:prstGeom prst="rect">
+            <a:avLst/>
+          </a:prstGeom>
+          <a:noFill/>
+        </p:spPr>
+        <p:txBody>
+          <a:bodyPr wrap="none" rtlCol="0">
+            <a:spAutoFit/>
+          </a:bodyPr>
+          <a:lstStyle/>
           <a:p>
             <a:r>
               <a:rPr lang="en-US" dirty="0">
                 <a:latin typeface="Arial" panose="020B0604020202020204" pitchFamily="34" charset="0"/>
                 <a:cs typeface="Arial" panose="020B0604020202020204" pitchFamily="34" charset="0"/>
               </a:rPr>
-              <a:t>(The book also does this in Chapter 15)</a:t>
+              <a:t>No contention ( as a control)</a:t>
+            </a:r>
+          </a:p>
+        </p:txBody>
+      </p:sp>
+      <p:cxnSp>
+        <p:nvCxnSpPr>
+          <p:cNvPr id="10" name="Straight Arrow Connector 9"/>
+          <p:cNvCxnSpPr/>
+          <p:nvPr/>
+        </p:nvCxnSpPr>
+        <p:spPr>
+          <a:xfrm flipH="1" flipV="1">
+            <a:off x="8217725" y="4999512"/>
+            <a:ext cx="629392" cy="902524"/>
+          </a:xfrm>
+          <a:prstGeom prst="straightConnector1">
+            <a:avLst/>
+          </a:prstGeom>
+          <a:ln>
+            <a:tailEnd type="triangle"/>
+          </a:ln>
+        </p:spPr>
+        <p:style>
+          <a:lnRef idx="1">
+            <a:schemeClr val="accent1"/>
+          </a:lnRef>
+          <a:fillRef idx="0">
+            <a:schemeClr val="accent1"/>
+          </a:fillRef>
+          <a:effectRef idx="0">
+            <a:schemeClr val="accent1"/>
+          </a:effectRef>
+          <a:fontRef idx="minor">
+            <a:schemeClr val="tx1"/>
+          </a:fontRef>
+        </p:style>
+      </p:cxnSp>
+      <p:sp>
+        <p:nvSpPr>
+          <p:cNvPr id="11" name="TextBox 10"/>
+          <p:cNvSpPr txBox="1"/>
+          <p:nvPr/>
+        </p:nvSpPr>
+        <p:spPr>
+          <a:xfrm>
+            <a:off x="7338951" y="5913915"/>
+            <a:ext cx="4160113" cy="646331"/>
+          </a:xfrm>
+          <a:prstGeom prst="rect">
+            <a:avLst/>
+          </a:prstGeom>
+          <a:noFill/>
+        </p:spPr>
+        <p:txBody>
+          <a:bodyPr wrap="none" rtlCol="0">
+            <a:spAutoFit/>
+          </a:bodyPr>
+          <a:lstStyle/>
+          <a:p>
+            <a:r>
+              <a:rPr lang="en-US" dirty="0">
+                <a:latin typeface="Arial" panose="020B0604020202020204" pitchFamily="34" charset="0"/>
+                <a:cs typeface="Arial" panose="020B0604020202020204" pitchFamily="34" charset="0"/>
+              </a:rPr>
+              <a:t>Asking for permission and </a:t>
+            </a:r>
+          </a:p>
+          <a:p>
+            <a:r>
+              <a:rPr lang="en-US" dirty="0">
+                <a:latin typeface="Arial" panose="020B0604020202020204" pitchFamily="34" charset="0"/>
+                <a:cs typeface="Arial" panose="020B0604020202020204" pitchFamily="34" charset="0"/>
+              </a:rPr>
+              <a:t>Begging forgiveness is about the same</a:t>
             </a:r>
           </a:p>
         </p:txBody>
@@ -5865,7 +6275,7 @@
     </p:spTree>
     <p:extLst>
       <p:ext uri="{BB962C8B-B14F-4D97-AF65-F5344CB8AC3E}">
-        <p14:creationId xmlns:p14="http://schemas.microsoft.com/office/powerpoint/2010/main" val="3813172588"/>
+        <p14:creationId xmlns:p14="http://schemas.microsoft.com/office/powerpoint/2010/main" val="2021534935"/>
       </p:ext>
     </p:extLst>
   </p:cSld>
@@ -5894,78 +6304,62 @@
       </p:grpSpPr>
       <p:pic>
         <p:nvPicPr>
-          <p:cNvPr id="5122" name="Picture 2"/>
+          <p:cNvPr id="4" name="Picture 3"/>
           <p:cNvPicPr>
-            <a:picLocks noChangeAspect="1" noChangeArrowheads="1"/>
+            <a:picLocks noChangeAspect="1"/>
           </p:cNvPicPr>
           <p:nvPr/>
         </p:nvPicPr>
         <p:blipFill>
-          <a:blip r:embed="rId3" cstate="print"/>
-          <a:srcRect/>
+          <a:blip r:embed="rId2"/>
           <a:stretch>
             <a:fillRect/>
           </a:stretch>
         </p:blipFill>
-        <p:spPr bwMode="auto">
-          <a:xfrm>
-            <a:off x="1524000" y="0"/>
-            <a:ext cx="5298558" cy="5334000"/>
-          </a:xfrm>
-          <a:prstGeom prst="rect">
-            <a:avLst/>
-          </a:prstGeom>
-          <a:noFill/>
-          <a:ln w="9525">
-            <a:noFill/>
-            <a:miter lim="800000"/>
-            <a:headEnd/>
-            <a:tailEnd/>
-          </a:ln>
+        <p:spPr>
+          <a:xfrm>
+            <a:off x="2488870" y="338446"/>
+            <a:ext cx="6858000" cy="457200"/>
+          </a:xfrm>
+          <a:prstGeom prst="rect">
+            <a:avLst/>
+          </a:prstGeom>
         </p:spPr>
       </p:pic>
       <p:pic>
         <p:nvPicPr>
-          <p:cNvPr id="5123" name="Picture 3"/>
+          <p:cNvPr id="5" name="Picture 4"/>
           <p:cNvPicPr>
-            <a:picLocks noChangeAspect="1" noChangeArrowheads="1"/>
+            <a:picLocks noChangeAspect="1"/>
           </p:cNvPicPr>
           <p:nvPr/>
         </p:nvPicPr>
         <p:blipFill>
-          <a:blip r:embed="rId4" cstate="print"/>
-          <a:srcRect/>
+          <a:blip r:embed="rId3"/>
           <a:stretch>
             <a:fillRect/>
           </a:stretch>
         </p:blipFill>
-        <p:spPr bwMode="auto">
-          <a:xfrm>
-            <a:off x="5486400" y="4998084"/>
-            <a:ext cx="4953000" cy="1783717"/>
-          </a:xfrm>
-          <a:prstGeom prst="rect">
-            <a:avLst/>
-          </a:prstGeom>
-          <a:noFill/>
-          <a:ln w="9525">
-            <a:noFill/>
-            <a:miter lim="800000"/>
-            <a:headEnd/>
-            <a:tailEnd/>
-          </a:ln>
+        <p:spPr>
+          <a:xfrm>
+            <a:off x="2688895" y="997526"/>
+            <a:ext cx="6457950" cy="2981325"/>
+          </a:xfrm>
+          <a:prstGeom prst="rect">
+            <a:avLst/>
+          </a:prstGeom>
         </p:spPr>
       </p:pic>
       <p:sp>
         <p:nvSpPr>
-          <p:cNvPr id="7" name="TextBox 6"/>
+          <p:cNvPr id="6" name="TextBox 5"/>
           <p:cNvSpPr txBox="1"/>
           <p:nvPr/>
         </p:nvSpPr>
         <p:spPr>
           <a:xfrm>
-            <a:off x="6477000" y="3276600"/>
-            <a:ext cx="4142544" cy="1754326"/>
+            <a:off x="1508166" y="3978851"/>
+            <a:ext cx="8558753" cy="646331"/>
           </a:xfrm>
           <a:prstGeom prst="rect">
             <a:avLst/>
@@ -5979,168 +6373,20 @@
           <a:lstStyle/>
           <a:p>
             <a:r>
-              <a:rPr lang="en-US" dirty="0"/>
-              <a:t>If another thread has interfered,</a:t>
-            </a:r>
-          </a:p>
-          <a:p>
-            <a:r>
-              <a:rPr lang="en-US" dirty="0"/>
-              <a:t>generate the next number.</a:t>
-            </a:r>
-          </a:p>
-          <a:p>
-            <a:endParaRPr lang="en-US" dirty="0"/>
-          </a:p>
-          <a:p>
-            <a:r>
-              <a:rPr lang="en-US" dirty="0"/>
-              <a:t>Pretty sweet…</a:t>
-            </a:r>
-          </a:p>
-          <a:p>
-            <a:endParaRPr lang="en-US" dirty="0"/>
-          </a:p>
-          <a:p>
-            <a:r>
-              <a:rPr lang="en-US" dirty="0"/>
-              <a:t>Thread safe with minimal synchronization.</a:t>
-            </a:r>
-          </a:p>
-        </p:txBody>
-      </p:sp>
-      <p:cxnSp>
-        <p:nvCxnSpPr>
-          <p:cNvPr id="9" name="Straight Arrow Connector 8"/>
-          <p:cNvCxnSpPr/>
-          <p:nvPr/>
-        </p:nvCxnSpPr>
-        <p:spPr>
-          <a:xfrm rot="10800000" flipV="1">
-            <a:off x="5486400" y="4038600"/>
-            <a:ext cx="990600" cy="762000"/>
-          </a:xfrm>
-          <a:prstGeom prst="straightConnector1">
-            <a:avLst/>
-          </a:prstGeom>
-          <a:ln>
-            <a:tailEnd type="arrow"/>
-          </a:ln>
-        </p:spPr>
-        <p:style>
-          <a:lnRef idx="1">
-            <a:schemeClr val="accent1"/>
-          </a:lnRef>
-          <a:fillRef idx="0">
-            <a:schemeClr val="accent1"/>
-          </a:fillRef>
-          <a:effectRef idx="0">
-            <a:schemeClr val="accent1"/>
-          </a:effectRef>
-          <a:fontRef idx="minor">
-            <a:schemeClr val="tx1"/>
-          </a:fontRef>
-        </p:style>
-      </p:cxnSp>
-      <p:sp>
-        <p:nvSpPr>
-          <p:cNvPr id="10" name="TextBox 9"/>
-          <p:cNvSpPr txBox="1"/>
-          <p:nvPr/>
-        </p:nvSpPr>
-        <p:spPr>
-          <a:xfrm>
-            <a:off x="1676401" y="5562601"/>
-            <a:ext cx="3752309" cy="646331"/>
-          </a:xfrm>
-          <a:prstGeom prst="rect">
-            <a:avLst/>
-          </a:prstGeom>
-          <a:noFill/>
-        </p:spPr>
-        <p:txBody>
-          <a:bodyPr wrap="none" rtlCol="0">
-            <a:spAutoFit/>
-          </a:bodyPr>
-          <a:lstStyle/>
-          <a:p>
-            <a:r>
-              <a:rPr lang="en-US" dirty="0"/>
-              <a:t>It would have been nice to more</a:t>
-            </a:r>
-          </a:p>
-          <a:p>
-            <a:r>
-              <a:rPr lang="en-US" dirty="0"/>
-              <a:t>explicitly document the thread safety!</a:t>
-            </a:r>
-          </a:p>
-        </p:txBody>
-      </p:sp>
-      <p:cxnSp>
-        <p:nvCxnSpPr>
-          <p:cNvPr id="12" name="Straight Arrow Connector 11"/>
-          <p:cNvCxnSpPr/>
-          <p:nvPr/>
-        </p:nvCxnSpPr>
-        <p:spPr>
-          <a:xfrm rot="10800000" flipV="1">
-            <a:off x="5257800" y="1219200"/>
-            <a:ext cx="1524000" cy="381000"/>
-          </a:xfrm>
-          <a:prstGeom prst="straightConnector1">
-            <a:avLst/>
-          </a:prstGeom>
-          <a:ln>
-            <a:tailEnd type="arrow"/>
-          </a:ln>
-        </p:spPr>
-        <p:style>
-          <a:lnRef idx="1">
-            <a:schemeClr val="accent1"/>
-          </a:lnRef>
-          <a:fillRef idx="0">
-            <a:schemeClr val="accent1"/>
-          </a:fillRef>
-          <a:effectRef idx="0">
-            <a:schemeClr val="accent1"/>
-          </a:effectRef>
-          <a:fontRef idx="minor">
-            <a:schemeClr val="tx1"/>
-          </a:fontRef>
-        </p:style>
-      </p:cxnSp>
-      <p:sp>
-        <p:nvSpPr>
-          <p:cNvPr id="13" name="TextBox 12"/>
-          <p:cNvSpPr txBox="1"/>
-          <p:nvPr/>
-        </p:nvSpPr>
-        <p:spPr>
-          <a:xfrm>
-            <a:off x="6858001" y="838201"/>
-            <a:ext cx="2761397" cy="646331"/>
-          </a:xfrm>
-          <a:prstGeom prst="rect">
-            <a:avLst/>
-          </a:prstGeom>
-          <a:noFill/>
-        </p:spPr>
-        <p:txBody>
-          <a:bodyPr wrap="none" rtlCol="0">
-            <a:spAutoFit/>
-          </a:bodyPr>
-          <a:lstStyle/>
-          <a:p>
-            <a:r>
-              <a:rPr lang="en-US" dirty="0"/>
-              <a:t>They do document that it is</a:t>
-            </a:r>
-          </a:p>
-          <a:p>
-            <a:r>
-              <a:rPr lang="en-US" dirty="0"/>
-              <a:t>atomic</a:t>
+              <a:rPr lang="en-US" dirty="0">
+                <a:latin typeface="Arial" panose="020B0604020202020204" pitchFamily="34" charset="0"/>
+                <a:cs typeface="Arial" panose="020B0604020202020204" pitchFamily="34" charset="0"/>
+              </a:rPr>
+              <a:t>Here begging forgiveness is a better strategy.</a:t>
+            </a:r>
+          </a:p>
+          <a:p>
+            <a:r>
+              <a:rPr lang="en-US" dirty="0">
+                <a:latin typeface="Arial" panose="020B0604020202020204" pitchFamily="34" charset="0"/>
+                <a:cs typeface="Arial" panose="020B0604020202020204" pitchFamily="34" charset="0"/>
+              </a:rPr>
+              <a:t>Our optimism that another thread hasn’t messed up our results is more rewarded..</a:t>
             </a:r>
           </a:p>
         </p:txBody>
@@ -6148,7 +6394,7 @@
     </p:spTree>
     <p:extLst>
       <p:ext uri="{BB962C8B-B14F-4D97-AF65-F5344CB8AC3E}">
-        <p14:creationId xmlns:p14="http://schemas.microsoft.com/office/powerpoint/2010/main" val="2700013775"/>
+        <p14:creationId xmlns:p14="http://schemas.microsoft.com/office/powerpoint/2010/main" val="1266999771"/>
       </p:ext>
     </p:extLst>
   </p:cSld>
@@ -6175,9 +6421,38 @@
           <a:chExt cx="0" cy="0"/>
         </a:xfrm>
       </p:grpSpPr>
+      <p:sp>
+        <p:nvSpPr>
+          <p:cNvPr id="4" name="TextBox 3"/>
+          <p:cNvSpPr txBox="1"/>
+          <p:nvPr/>
+        </p:nvSpPr>
+        <p:spPr>
+          <a:xfrm>
+            <a:off x="2590800" y="1419225"/>
+            <a:ext cx="3908506" cy="369332"/>
+          </a:xfrm>
+          <a:prstGeom prst="rect">
+            <a:avLst/>
+          </a:prstGeom>
+          <a:noFill/>
+        </p:spPr>
+        <p:txBody>
+          <a:bodyPr wrap="none" rtlCol="0">
+            <a:spAutoFit/>
+          </a:bodyPr>
+          <a:lstStyle/>
+          <a:p>
+            <a:r>
+              <a:rPr lang="en-US" dirty="0"/>
+              <a:t>There is, of course, no documentation.  </a:t>
+            </a:r>
+          </a:p>
+        </p:txBody>
+      </p:sp>
       <p:pic>
         <p:nvPicPr>
-          <p:cNvPr id="2050" name="Picture 2"/>
+          <p:cNvPr id="4099" name="Picture 3"/>
           <p:cNvPicPr>
             <a:picLocks noChangeAspect="1" noChangeArrowheads="1"/>
           </p:cNvPicPr>
@@ -6192,8 +6467,8 @@
         </p:blipFill>
         <p:spPr bwMode="auto">
           <a:xfrm>
-            <a:off x="2133600" y="4419600"/>
-            <a:ext cx="7258050" cy="2362200"/>
+            <a:off x="2590801" y="1800226"/>
+            <a:ext cx="5934075" cy="3533775"/>
           </a:xfrm>
           <a:prstGeom prst="rect">
             <a:avLst/>
@@ -6207,42 +6482,65 @@
           </a:ln>
         </p:spPr>
       </p:pic>
-      <p:pic>
-        <p:nvPicPr>
-          <p:cNvPr id="2051" name="Picture 3"/>
-          <p:cNvPicPr>
-            <a:picLocks noChangeAspect="1" noChangeArrowheads="1"/>
-          </p:cNvPicPr>
-          <p:nvPr/>
-        </p:nvPicPr>
-        <p:blipFill>
-          <a:blip r:embed="rId4" cstate="print"/>
-          <a:srcRect/>
-          <a:stretch>
-            <a:fillRect/>
-          </a:stretch>
-        </p:blipFill>
-        <p:spPr bwMode="auto">
-          <a:xfrm>
-            <a:off x="1905000" y="1"/>
-            <a:ext cx="6781800" cy="4412815"/>
+      <p:sp>
+        <p:nvSpPr>
+          <p:cNvPr id="7" name="TextBox 6"/>
+          <p:cNvSpPr txBox="1"/>
+          <p:nvPr/>
+        </p:nvSpPr>
+        <p:spPr>
+          <a:xfrm>
+            <a:off x="1981201" y="152401"/>
+            <a:ext cx="5425524" cy="646331"/>
           </a:xfrm>
           <a:prstGeom prst="rect">
             <a:avLst/>
           </a:prstGeom>
           <a:noFill/>
-          <a:ln w="9525">
-            <a:noFill/>
-            <a:miter lim="800000"/>
-            <a:headEnd/>
-            <a:tailEnd/>
-          </a:ln>
-        </p:spPr>
-      </p:pic>
+        </p:spPr>
+        <p:txBody>
+          <a:bodyPr wrap="none" rtlCol="0">
+            <a:spAutoFit/>
+          </a:bodyPr>
+          <a:lstStyle/>
+          <a:p>
+            <a:r>
+              <a:rPr lang="en-US" dirty="0">
+                <a:latin typeface="Arial" panose="020B0604020202020204" pitchFamily="34" charset="0"/>
+                <a:cs typeface="Arial" panose="020B0604020202020204" pitchFamily="34" charset="0"/>
+              </a:rPr>
+              <a:t>We revisit here our discussion of </a:t>
+            </a:r>
+            <a:r>
+              <a:rPr lang="en-US" dirty="0" err="1">
+                <a:latin typeface="Arial" panose="020B0604020202020204" pitchFamily="34" charset="0"/>
+                <a:cs typeface="Arial" panose="020B0604020202020204" pitchFamily="34" charset="0"/>
+              </a:rPr>
+              <a:t>Random.nextInt</a:t>
+            </a:r>
+            <a:r>
+              <a:rPr lang="en-US" dirty="0">
+                <a:latin typeface="Arial" panose="020B0604020202020204" pitchFamily="34" charset="0"/>
+                <a:cs typeface="Arial" panose="020B0604020202020204" pitchFamily="34" charset="0"/>
+              </a:rPr>
+              <a:t>() </a:t>
+            </a:r>
+          </a:p>
+          <a:p>
+            <a:r>
+              <a:rPr lang="en-US" dirty="0">
+                <a:latin typeface="Arial" panose="020B0604020202020204" pitchFamily="34" charset="0"/>
+                <a:cs typeface="Arial" panose="020B0604020202020204" pitchFamily="34" charset="0"/>
+              </a:rPr>
+              <a:t>(The book also does this in Chapter 15)</a:t>
+            </a:r>
+          </a:p>
+        </p:txBody>
+      </p:sp>
     </p:spTree>
     <p:extLst>
       <p:ext uri="{BB962C8B-B14F-4D97-AF65-F5344CB8AC3E}">
-        <p14:creationId xmlns:p14="http://schemas.microsoft.com/office/powerpoint/2010/main" val="1540940791"/>
+        <p14:creationId xmlns:p14="http://schemas.microsoft.com/office/powerpoint/2010/main" val="3813172588"/>
       </p:ext>
     </p:extLst>
   </p:cSld>
@@ -6269,50 +6567,9 @@
           <a:chExt cx="0" cy="0"/>
         </a:xfrm>
       </p:grpSpPr>
-      <p:sp>
-        <p:nvSpPr>
-          <p:cNvPr id="5" name="TextBox 4"/>
-          <p:cNvSpPr txBox="1"/>
-          <p:nvPr/>
-        </p:nvSpPr>
-        <p:spPr>
-          <a:xfrm>
-            <a:off x="2133601" y="76200"/>
-            <a:ext cx="6618287" cy="923330"/>
-          </a:xfrm>
-          <a:prstGeom prst="rect">
-            <a:avLst/>
-          </a:prstGeom>
-          <a:noFill/>
-        </p:spPr>
-        <p:txBody>
-          <a:bodyPr wrap="none" rtlCol="0">
-            <a:spAutoFit/>
-          </a:bodyPr>
-          <a:lstStyle/>
-          <a:p>
-            <a:r>
-              <a:rPr lang="en-US" dirty="0"/>
-              <a:t>There is some (minimal) resource contention here but not too bad..</a:t>
-            </a:r>
-          </a:p>
-          <a:p>
-            <a:r>
-              <a:rPr lang="en-US" dirty="0"/>
-              <a:t>When the threads interfere with each other, they spin…</a:t>
-            </a:r>
-          </a:p>
-          <a:p>
-            <a:r>
-              <a:rPr lang="en-US" dirty="0"/>
-              <a:t> </a:t>
-            </a:r>
-          </a:p>
-        </p:txBody>
-      </p:sp>
       <p:pic>
         <p:nvPicPr>
-          <p:cNvPr id="6146" name="Picture 2"/>
+          <p:cNvPr id="5122" name="Picture 2"/>
           <p:cNvPicPr>
             <a:picLocks noChangeAspect="1" noChangeArrowheads="1"/>
           </p:cNvPicPr>
@@ -6327,8 +6584,8 @@
         </p:blipFill>
         <p:spPr bwMode="auto">
           <a:xfrm>
-            <a:off x="1752601" y="838200"/>
-            <a:ext cx="7134225" cy="5685350"/>
+            <a:off x="1524000" y="0"/>
+            <a:ext cx="5298558" cy="5334000"/>
           </a:xfrm>
           <a:prstGeom prst="rect">
             <a:avLst/>
@@ -6342,6 +6599,38 @@
           </a:ln>
         </p:spPr>
       </p:pic>
+      <p:pic>
+        <p:nvPicPr>
+          <p:cNvPr id="5123" name="Picture 3"/>
+          <p:cNvPicPr>
+            <a:picLocks noChangeAspect="1" noChangeArrowheads="1"/>
+          </p:cNvPicPr>
+          <p:nvPr/>
+        </p:nvPicPr>
+        <p:blipFill>
+          <a:blip r:embed="rId4" cstate="print"/>
+          <a:srcRect/>
+          <a:stretch>
+            <a:fillRect/>
+          </a:stretch>
+        </p:blipFill>
+        <p:spPr bwMode="auto">
+          <a:xfrm>
+            <a:off x="5486400" y="4998084"/>
+            <a:ext cx="4953000" cy="1783717"/>
+          </a:xfrm>
+          <a:prstGeom prst="rect">
+            <a:avLst/>
+          </a:prstGeom>
+          <a:noFill/>
+          <a:ln w="9525">
+            <a:noFill/>
+            <a:miter lim="800000"/>
+            <a:headEnd/>
+            <a:tailEnd/>
+          </a:ln>
+        </p:spPr>
+      </p:pic>
       <p:sp>
         <p:nvSpPr>
           <p:cNvPr id="7" name="TextBox 6"/>
@@ -6350,8 +6639,8 @@
         </p:nvSpPr>
         <p:spPr>
           <a:xfrm>
-            <a:off x="2057400" y="6324600"/>
-            <a:ext cx="2350002" cy="369332"/>
+            <a:off x="6477000" y="3276600"/>
+            <a:ext cx="4142544" cy="1754326"/>
           </a:xfrm>
           <a:prstGeom prst="rect">
             <a:avLst/>
@@ -6366,7 +6655,167 @@
           <a:p>
             <a:r>
               <a:rPr lang="en-US" dirty="0"/>
-              <a:t>This runs in ~2 seconds</a:t>
+              <a:t>If another thread has interfered,</a:t>
+            </a:r>
+          </a:p>
+          <a:p>
+            <a:r>
+              <a:rPr lang="en-US" dirty="0"/>
+              <a:t>generate the next number.</a:t>
+            </a:r>
+          </a:p>
+          <a:p>
+            <a:endParaRPr lang="en-US" dirty="0"/>
+          </a:p>
+          <a:p>
+            <a:r>
+              <a:rPr lang="en-US" dirty="0"/>
+              <a:t>Pretty sweet…</a:t>
+            </a:r>
+          </a:p>
+          <a:p>
+            <a:endParaRPr lang="en-US" dirty="0"/>
+          </a:p>
+          <a:p>
+            <a:r>
+              <a:rPr lang="en-US" dirty="0"/>
+              <a:t>Thread safe with minimal synchronization.</a:t>
+            </a:r>
+          </a:p>
+        </p:txBody>
+      </p:sp>
+      <p:cxnSp>
+        <p:nvCxnSpPr>
+          <p:cNvPr id="9" name="Straight Arrow Connector 8"/>
+          <p:cNvCxnSpPr/>
+          <p:nvPr/>
+        </p:nvCxnSpPr>
+        <p:spPr>
+          <a:xfrm rot="10800000" flipV="1">
+            <a:off x="5486400" y="4038600"/>
+            <a:ext cx="990600" cy="762000"/>
+          </a:xfrm>
+          <a:prstGeom prst="straightConnector1">
+            <a:avLst/>
+          </a:prstGeom>
+          <a:ln>
+            <a:tailEnd type="arrow"/>
+          </a:ln>
+        </p:spPr>
+        <p:style>
+          <a:lnRef idx="1">
+            <a:schemeClr val="accent1"/>
+          </a:lnRef>
+          <a:fillRef idx="0">
+            <a:schemeClr val="accent1"/>
+          </a:fillRef>
+          <a:effectRef idx="0">
+            <a:schemeClr val="accent1"/>
+          </a:effectRef>
+          <a:fontRef idx="minor">
+            <a:schemeClr val="tx1"/>
+          </a:fontRef>
+        </p:style>
+      </p:cxnSp>
+      <p:sp>
+        <p:nvSpPr>
+          <p:cNvPr id="10" name="TextBox 9"/>
+          <p:cNvSpPr txBox="1"/>
+          <p:nvPr/>
+        </p:nvSpPr>
+        <p:spPr>
+          <a:xfrm>
+            <a:off x="1676401" y="5562601"/>
+            <a:ext cx="3752309" cy="646331"/>
+          </a:xfrm>
+          <a:prstGeom prst="rect">
+            <a:avLst/>
+          </a:prstGeom>
+          <a:noFill/>
+        </p:spPr>
+        <p:txBody>
+          <a:bodyPr wrap="none" rtlCol="0">
+            <a:spAutoFit/>
+          </a:bodyPr>
+          <a:lstStyle/>
+          <a:p>
+            <a:r>
+              <a:rPr lang="en-US" dirty="0"/>
+              <a:t>It would have been nice to more</a:t>
+            </a:r>
+          </a:p>
+          <a:p>
+            <a:r>
+              <a:rPr lang="en-US" dirty="0"/>
+              <a:t>explicitly document the thread safety!</a:t>
+            </a:r>
+          </a:p>
+        </p:txBody>
+      </p:sp>
+      <p:cxnSp>
+        <p:nvCxnSpPr>
+          <p:cNvPr id="12" name="Straight Arrow Connector 11"/>
+          <p:cNvCxnSpPr/>
+          <p:nvPr/>
+        </p:nvCxnSpPr>
+        <p:spPr>
+          <a:xfrm rot="10800000" flipV="1">
+            <a:off x="5257800" y="1219200"/>
+            <a:ext cx="1524000" cy="381000"/>
+          </a:xfrm>
+          <a:prstGeom prst="straightConnector1">
+            <a:avLst/>
+          </a:prstGeom>
+          <a:ln>
+            <a:tailEnd type="arrow"/>
+          </a:ln>
+        </p:spPr>
+        <p:style>
+          <a:lnRef idx="1">
+            <a:schemeClr val="accent1"/>
+          </a:lnRef>
+          <a:fillRef idx="0">
+            <a:schemeClr val="accent1"/>
+          </a:fillRef>
+          <a:effectRef idx="0">
+            <a:schemeClr val="accent1"/>
+          </a:effectRef>
+          <a:fontRef idx="minor">
+            <a:schemeClr val="tx1"/>
+          </a:fontRef>
+        </p:style>
+      </p:cxnSp>
+      <p:sp>
+        <p:nvSpPr>
+          <p:cNvPr id="13" name="TextBox 12"/>
+          <p:cNvSpPr txBox="1"/>
+          <p:nvPr/>
+        </p:nvSpPr>
+        <p:spPr>
+          <a:xfrm>
+            <a:off x="6858001" y="838201"/>
+            <a:ext cx="2761397" cy="646331"/>
+          </a:xfrm>
+          <a:prstGeom prst="rect">
+            <a:avLst/>
+          </a:prstGeom>
+          <a:noFill/>
+        </p:spPr>
+        <p:txBody>
+          <a:bodyPr wrap="none" rtlCol="0">
+            <a:spAutoFit/>
+          </a:bodyPr>
+          <a:lstStyle/>
+          <a:p>
+            <a:r>
+              <a:rPr lang="en-US" dirty="0"/>
+              <a:t>They do document that it is</a:t>
+            </a:r>
+          </a:p>
+          <a:p>
+            <a:r>
+              <a:rPr lang="en-US" dirty="0"/>
+              <a:t>atomic</a:t>
             </a:r>
           </a:p>
         </p:txBody>
@@ -6374,7 +6823,7 @@
     </p:spTree>
     <p:extLst>
       <p:ext uri="{BB962C8B-B14F-4D97-AF65-F5344CB8AC3E}">
-        <p14:creationId xmlns:p14="http://schemas.microsoft.com/office/powerpoint/2010/main" val="3573796042"/>
+        <p14:creationId xmlns:p14="http://schemas.microsoft.com/office/powerpoint/2010/main" val="2700013775"/>
       </p:ext>
     </p:extLst>
   </p:cSld>
@@ -6403,7 +6852,7 @@
       </p:grpSpPr>
       <p:pic>
         <p:nvPicPr>
-          <p:cNvPr id="7170" name="Picture 2"/>
+          <p:cNvPr id="2050" name="Picture 2"/>
           <p:cNvPicPr>
             <a:picLocks noChangeAspect="1" noChangeArrowheads="1"/>
           </p:cNvPicPr>
@@ -6418,8 +6867,8 @@
         </p:blipFill>
         <p:spPr bwMode="auto">
           <a:xfrm>
-            <a:off x="1981200" y="-76200"/>
-            <a:ext cx="7505700" cy="6657975"/>
+            <a:off x="2133600" y="4419600"/>
+            <a:ext cx="7258050" cy="2362200"/>
           </a:xfrm>
           <a:prstGeom prst="rect">
             <a:avLst/>
@@ -6433,53 +6882,42 @@
           </a:ln>
         </p:spPr>
       </p:pic>
-      <p:sp>
-        <p:nvSpPr>
-          <p:cNvPr id="5" name="TextBox 4"/>
-          <p:cNvSpPr txBox="1"/>
-          <p:nvPr/>
-        </p:nvSpPr>
-        <p:spPr>
-          <a:xfrm>
-            <a:off x="2514600" y="6172201"/>
-            <a:ext cx="8054834" cy="646331"/>
+      <p:pic>
+        <p:nvPicPr>
+          <p:cNvPr id="2051" name="Picture 3"/>
+          <p:cNvPicPr>
+            <a:picLocks noChangeAspect="1" noChangeArrowheads="1"/>
+          </p:cNvPicPr>
+          <p:nvPr/>
+        </p:nvPicPr>
+        <p:blipFill>
+          <a:blip r:embed="rId4" cstate="print"/>
+          <a:srcRect/>
+          <a:stretch>
+            <a:fillRect/>
+          </a:stretch>
+        </p:blipFill>
+        <p:spPr bwMode="auto">
+          <a:xfrm>
+            <a:off x="1905000" y="1"/>
+            <a:ext cx="6781800" cy="4412815"/>
           </a:xfrm>
           <a:prstGeom prst="rect">
             <a:avLst/>
           </a:prstGeom>
           <a:noFill/>
-        </p:spPr>
-        <p:txBody>
-          <a:bodyPr wrap="none" rtlCol="0">
-            <a:spAutoFit/>
-          </a:bodyPr>
-          <a:lstStyle/>
-          <a:p>
-            <a:r>
-              <a:rPr lang="en-US" dirty="0"/>
-              <a:t>Give each thread its own random is about 0.5 seconds</a:t>
-            </a:r>
-          </a:p>
-          <a:p>
-            <a:r>
-              <a:rPr lang="en-US" dirty="0"/>
-              <a:t>(but is actually a bad idea because many of those </a:t>
-            </a:r>
-            <a:r>
-              <a:rPr lang="en-US" dirty="0" err="1"/>
-              <a:t>randoms</a:t>
-            </a:r>
-            <a:r>
-              <a:rPr lang="en-US" dirty="0"/>
-              <a:t> will have the same seed!)</a:t>
-            </a:r>
-          </a:p>
-        </p:txBody>
-      </p:sp>
+          <a:ln w="9525">
+            <a:noFill/>
+            <a:miter lim="800000"/>
+            <a:headEnd/>
+            <a:tailEnd/>
+          </a:ln>
+        </p:spPr>
+      </p:pic>
     </p:spTree>
     <p:extLst>
       <p:ext uri="{BB962C8B-B14F-4D97-AF65-F5344CB8AC3E}">
-        <p14:creationId xmlns:p14="http://schemas.microsoft.com/office/powerpoint/2010/main" val="1677668037"/>
+        <p14:creationId xmlns:p14="http://schemas.microsoft.com/office/powerpoint/2010/main" val="1540940791"/>
       </p:ext>
     </p:extLst>
   </p:cSld>
@@ -6508,6 +6946,243 @@
       </p:grpSpPr>
       <p:sp>
         <p:nvSpPr>
+          <p:cNvPr id="5" name="TextBox 4"/>
+          <p:cNvSpPr txBox="1"/>
+          <p:nvPr/>
+        </p:nvSpPr>
+        <p:spPr>
+          <a:xfrm>
+            <a:off x="2133601" y="76200"/>
+            <a:ext cx="6618287" cy="923330"/>
+          </a:xfrm>
+          <a:prstGeom prst="rect">
+            <a:avLst/>
+          </a:prstGeom>
+          <a:noFill/>
+        </p:spPr>
+        <p:txBody>
+          <a:bodyPr wrap="none" rtlCol="0">
+            <a:spAutoFit/>
+          </a:bodyPr>
+          <a:lstStyle/>
+          <a:p>
+            <a:r>
+              <a:rPr lang="en-US" dirty="0"/>
+              <a:t>There is some (minimal) resource contention here but not too bad..</a:t>
+            </a:r>
+          </a:p>
+          <a:p>
+            <a:r>
+              <a:rPr lang="en-US" dirty="0"/>
+              <a:t>When the threads interfere with each other, they spin…</a:t>
+            </a:r>
+          </a:p>
+          <a:p>
+            <a:r>
+              <a:rPr lang="en-US" dirty="0"/>
+              <a:t> </a:t>
+            </a:r>
+          </a:p>
+        </p:txBody>
+      </p:sp>
+      <p:pic>
+        <p:nvPicPr>
+          <p:cNvPr id="6146" name="Picture 2"/>
+          <p:cNvPicPr>
+            <a:picLocks noChangeAspect="1" noChangeArrowheads="1"/>
+          </p:cNvPicPr>
+          <p:nvPr/>
+        </p:nvPicPr>
+        <p:blipFill>
+          <a:blip r:embed="rId3" cstate="print"/>
+          <a:srcRect/>
+          <a:stretch>
+            <a:fillRect/>
+          </a:stretch>
+        </p:blipFill>
+        <p:spPr bwMode="auto">
+          <a:xfrm>
+            <a:off x="1752601" y="838200"/>
+            <a:ext cx="7134225" cy="5685350"/>
+          </a:xfrm>
+          <a:prstGeom prst="rect">
+            <a:avLst/>
+          </a:prstGeom>
+          <a:noFill/>
+          <a:ln w="9525">
+            <a:noFill/>
+            <a:miter lim="800000"/>
+            <a:headEnd/>
+            <a:tailEnd/>
+          </a:ln>
+        </p:spPr>
+      </p:pic>
+      <p:sp>
+        <p:nvSpPr>
+          <p:cNvPr id="7" name="TextBox 6"/>
+          <p:cNvSpPr txBox="1"/>
+          <p:nvPr/>
+        </p:nvSpPr>
+        <p:spPr>
+          <a:xfrm>
+            <a:off x="2057400" y="6324600"/>
+            <a:ext cx="2350002" cy="369332"/>
+          </a:xfrm>
+          <a:prstGeom prst="rect">
+            <a:avLst/>
+          </a:prstGeom>
+          <a:noFill/>
+        </p:spPr>
+        <p:txBody>
+          <a:bodyPr wrap="none" rtlCol="0">
+            <a:spAutoFit/>
+          </a:bodyPr>
+          <a:lstStyle/>
+          <a:p>
+            <a:r>
+              <a:rPr lang="en-US" dirty="0"/>
+              <a:t>This runs in ~2 seconds</a:t>
+            </a:r>
+          </a:p>
+        </p:txBody>
+      </p:sp>
+    </p:spTree>
+    <p:extLst>
+      <p:ext uri="{BB962C8B-B14F-4D97-AF65-F5344CB8AC3E}">
+        <p14:creationId xmlns:p14="http://schemas.microsoft.com/office/powerpoint/2010/main" val="3573796042"/>
+      </p:ext>
+    </p:extLst>
+  </p:cSld>
+  <p:clrMapOvr>
+    <a:masterClrMapping/>
+  </p:clrMapOvr>
+</p:sld>
+</file>
+
+<file path=ppt/slides/slide26.xml><?xml version="1.0" encoding="utf-8"?>
+<p:sld xmlns:a="http://schemas.openxmlformats.org/drawingml/2006/main" xmlns:r="http://schemas.openxmlformats.org/officeDocument/2006/relationships" xmlns:p="http://schemas.openxmlformats.org/presentationml/2006/main">
+  <p:cSld>
+    <p:spTree>
+      <p:nvGrpSpPr>
+        <p:cNvPr id="1" name=""/>
+        <p:cNvGrpSpPr/>
+        <p:nvPr/>
+      </p:nvGrpSpPr>
+      <p:grpSpPr>
+        <a:xfrm>
+          <a:off x="0" y="0"/>
+          <a:ext cx="0" cy="0"/>
+          <a:chOff x="0" y="0"/>
+          <a:chExt cx="0" cy="0"/>
+        </a:xfrm>
+      </p:grpSpPr>
+      <p:pic>
+        <p:nvPicPr>
+          <p:cNvPr id="7170" name="Picture 2"/>
+          <p:cNvPicPr>
+            <a:picLocks noChangeAspect="1" noChangeArrowheads="1"/>
+          </p:cNvPicPr>
+          <p:nvPr/>
+        </p:nvPicPr>
+        <p:blipFill>
+          <a:blip r:embed="rId3" cstate="print"/>
+          <a:srcRect/>
+          <a:stretch>
+            <a:fillRect/>
+          </a:stretch>
+        </p:blipFill>
+        <p:spPr bwMode="auto">
+          <a:xfrm>
+            <a:off x="1981200" y="-76200"/>
+            <a:ext cx="7505700" cy="6657975"/>
+          </a:xfrm>
+          <a:prstGeom prst="rect">
+            <a:avLst/>
+          </a:prstGeom>
+          <a:noFill/>
+          <a:ln w="9525">
+            <a:noFill/>
+            <a:miter lim="800000"/>
+            <a:headEnd/>
+            <a:tailEnd/>
+          </a:ln>
+        </p:spPr>
+      </p:pic>
+      <p:sp>
+        <p:nvSpPr>
+          <p:cNvPr id="5" name="TextBox 4"/>
+          <p:cNvSpPr txBox="1"/>
+          <p:nvPr/>
+        </p:nvSpPr>
+        <p:spPr>
+          <a:xfrm>
+            <a:off x="2514600" y="6172201"/>
+            <a:ext cx="8054834" cy="646331"/>
+          </a:xfrm>
+          <a:prstGeom prst="rect">
+            <a:avLst/>
+          </a:prstGeom>
+          <a:noFill/>
+        </p:spPr>
+        <p:txBody>
+          <a:bodyPr wrap="none" rtlCol="0">
+            <a:spAutoFit/>
+          </a:bodyPr>
+          <a:lstStyle/>
+          <a:p>
+            <a:r>
+              <a:rPr lang="en-US" dirty="0"/>
+              <a:t>Give each thread its own random is about 0.5 seconds</a:t>
+            </a:r>
+          </a:p>
+          <a:p>
+            <a:r>
+              <a:rPr lang="en-US" dirty="0"/>
+              <a:t>(but is actually a bad idea because many of those </a:t>
+            </a:r>
+            <a:r>
+              <a:rPr lang="en-US" dirty="0" err="1"/>
+              <a:t>randoms</a:t>
+            </a:r>
+            <a:r>
+              <a:rPr lang="en-US" dirty="0"/>
+              <a:t> will have the same seed!)</a:t>
+            </a:r>
+          </a:p>
+        </p:txBody>
+      </p:sp>
+    </p:spTree>
+    <p:extLst>
+      <p:ext uri="{BB962C8B-B14F-4D97-AF65-F5344CB8AC3E}">
+        <p14:creationId xmlns:p14="http://schemas.microsoft.com/office/powerpoint/2010/main" val="1677668037"/>
+      </p:ext>
+    </p:extLst>
+  </p:cSld>
+  <p:clrMapOvr>
+    <a:masterClrMapping/>
+  </p:clrMapOvr>
+</p:sld>
+</file>
+
+<file path=ppt/slides/slide27.xml><?xml version="1.0" encoding="utf-8"?>
+<p:sld xmlns:a="http://schemas.openxmlformats.org/drawingml/2006/main" xmlns:r="http://schemas.openxmlformats.org/officeDocument/2006/relationships" xmlns:p="http://schemas.openxmlformats.org/presentationml/2006/main">
+  <p:cSld>
+    <p:spTree>
+      <p:nvGrpSpPr>
+        <p:cNvPr id="1" name=""/>
+        <p:cNvGrpSpPr/>
+        <p:nvPr/>
+      </p:nvGrpSpPr>
+      <p:grpSpPr>
+        <a:xfrm>
+          <a:off x="0" y="0"/>
+          <a:ext cx="0" cy="0"/>
+          <a:chOff x="0" y="0"/>
+          <a:chExt cx="0" cy="0"/>
+        </a:xfrm>
+      </p:grpSpPr>
+      <p:sp>
+        <p:nvSpPr>
           <p:cNvPr id="4" name="TextBox 3"/>
           <p:cNvSpPr txBox="1"/>
           <p:nvPr/>
@@ -6613,7 +7288,7 @@
 </p:sld>
 </file>
 
-<file path=ppt/slides/slide26.xml><?xml version="1.0" encoding="utf-8"?>
+<file path=ppt/slides/slide28.xml><?xml version="1.0" encoding="utf-8"?>
 <p:sld xmlns:a="http://schemas.openxmlformats.org/drawingml/2006/main" xmlns:r="http://schemas.openxmlformats.org/officeDocument/2006/relationships" xmlns:p="http://schemas.openxmlformats.org/presentationml/2006/main">
   <p:cSld>
     <p:spTree>

</xml_diff>